<commit_message>
progress on checkpoint ppt
</commit_message>
<xml_diff>
--- a/P2/CheckPoint 1.pptx
+++ b/P2/CheckPoint 1.pptx
@@ -5,16 +5,17 @@
     <p:sldMasterId id="2147483660" r:id="rId4"/>
   </p:sldMasterIdLst>
   <p:notesMasterIdLst>
-    <p:notesMasterId r:id="rId9"/>
+    <p:notesMasterId r:id="rId10"/>
   </p:notesMasterIdLst>
   <p:handoutMasterIdLst>
-    <p:handoutMasterId r:id="rId10"/>
+    <p:handoutMasterId r:id="rId11"/>
   </p:handoutMasterIdLst>
   <p:sldIdLst>
     <p:sldId id="257" r:id="rId5"/>
     <p:sldId id="268" r:id="rId6"/>
-    <p:sldId id="261" r:id="rId7"/>
-    <p:sldId id="269" r:id="rId8"/>
+    <p:sldId id="270" r:id="rId7"/>
+    <p:sldId id="261" r:id="rId8"/>
+    <p:sldId id="269" r:id="rId9"/>
   </p:sldIdLst>
   <p:sldSz cx="12188825" cy="6858000"/>
   <p:notesSz cx="6858000" cy="9144000"/>
@@ -298,7 +299,7 @@
             <a:pPr rtl="0"/>
             <a:fld id="{79429053-DC2A-4342-ADD4-2FD729D91E2C}" type="slidenum">
               <a:rPr/>
-              <a:t>‹nº›</a:t>
+              <a:t>‹#›</a:t>
             </a:fld>
             <a:endParaRPr/>
           </a:p>
@@ -555,7 +556,7 @@
             <a:pPr rtl="0"/>
             <a:fld id="{3EBA5BD7-F043-4D1B-AA17-CD412FC534DE}" type="slidenum">
               <a:rPr/>
-              <a:t>‹nº›</a:t>
+              <a:t>‹#›</a:t>
             </a:fld>
             <a:endParaRPr/>
           </a:p>
@@ -1467,7 +1468,7 @@
             <a:pPr rtl="0"/>
             <a:fld id="{C014DD1E-5D91-48A3-AD6D-45FBA980D106}" type="slidenum">
               <a:rPr/>
-              <a:t>‹nº›</a:t>
+              <a:t>‹#›</a:t>
             </a:fld>
             <a:endParaRPr/>
           </a:p>
@@ -1669,7 +1670,7 @@
             <a:pPr rtl="0"/>
             <a:fld id="{C014DD1E-5D91-48A3-AD6D-45FBA980D106}" type="slidenum">
               <a:rPr/>
-              <a:t>‹nº›</a:t>
+              <a:t>‹#›</a:t>
             </a:fld>
             <a:endParaRPr/>
           </a:p>
@@ -1881,7 +1882,7 @@
             <a:pPr rtl="0"/>
             <a:fld id="{C014DD1E-5D91-48A3-AD6D-45FBA980D106}" type="slidenum">
               <a:rPr/>
-              <a:t>‹nº›</a:t>
+              <a:t>‹#›</a:t>
             </a:fld>
             <a:endParaRPr/>
           </a:p>
@@ -2083,7 +2084,7 @@
             <a:pPr rtl="0"/>
             <a:fld id="{C014DD1E-5D91-48A3-AD6D-45FBA980D106}" type="slidenum">
               <a:rPr/>
-              <a:t>‹nº›</a:t>
+              <a:t>‹#›</a:t>
             </a:fld>
             <a:endParaRPr/>
           </a:p>
@@ -2519,7 +2520,7 @@
             <a:pPr rtl="0"/>
             <a:fld id="{C014DD1E-5D91-48A3-AD6D-45FBA980D106}" type="slidenum">
               <a:rPr/>
-              <a:t>‹nº›</a:t>
+              <a:t>‹#›</a:t>
             </a:fld>
             <a:endParaRPr/>
           </a:p>
@@ -2827,7 +2828,7 @@
             <a:pPr rtl="0"/>
             <a:fld id="{C014DD1E-5D91-48A3-AD6D-45FBA980D106}" type="slidenum">
               <a:rPr/>
-              <a:t>‹nº›</a:t>
+              <a:t>‹#›</a:t>
             </a:fld>
             <a:endParaRPr/>
           </a:p>
@@ -3287,7 +3288,7 @@
             <a:pPr rtl="0"/>
             <a:fld id="{C014DD1E-5D91-48A3-AD6D-45FBA980D106}" type="slidenum">
               <a:rPr/>
-              <a:t>‹nº›</a:t>
+              <a:t>‹#›</a:t>
             </a:fld>
             <a:endParaRPr/>
           </a:p>
@@ -3421,7 +3422,7 @@
             <a:pPr rtl="0"/>
             <a:fld id="{C014DD1E-5D91-48A3-AD6D-45FBA980D106}" type="slidenum">
               <a:rPr/>
-              <a:t>‹nº›</a:t>
+              <a:t>‹#›</a:t>
             </a:fld>
             <a:endParaRPr/>
           </a:p>
@@ -3531,7 +3532,7 @@
             <a:pPr rtl="0"/>
             <a:fld id="{C014DD1E-5D91-48A3-AD6D-45FBA980D106}" type="slidenum">
               <a:rPr/>
-              <a:t>‹nº›</a:t>
+              <a:t>‹#›</a:t>
             </a:fld>
             <a:endParaRPr/>
           </a:p>
@@ -3834,7 +3835,7 @@
             <a:pPr rtl="0"/>
             <a:fld id="{C014DD1E-5D91-48A3-AD6D-45FBA980D106}" type="slidenum">
               <a:rPr/>
-              <a:t>‹nº›</a:t>
+              <a:t>‹#›</a:t>
             </a:fld>
             <a:endParaRPr/>
           </a:p>
@@ -4127,7 +4128,7 @@
             <a:pPr rtl="0"/>
             <a:fld id="{C014DD1E-5D91-48A3-AD6D-45FBA980D106}" type="slidenum">
               <a:rPr/>
-              <a:t>‹nº›</a:t>
+              <a:t>‹#›</a:t>
             </a:fld>
             <a:endParaRPr/>
           </a:p>
@@ -4790,7 +4791,7 @@
             <a:fld id="{C014DD1E-5D91-48A3-AD6D-45FBA980D106}" type="slidenum">
               <a:rPr/>
               <a:pPr rtl="0"/>
-              <a:t>‹nº›</a:t>
+              <a:t>‹#›</a:t>
             </a:fld>
             <a:endParaRPr/>
           </a:p>
@@ -5693,7 +5694,7 @@
         <p:spPr>
           <a:xfrm>
             <a:off x="1218883" y="1701797"/>
-            <a:ext cx="5883641" cy="4462272"/>
+            <a:ext cx="10132113" cy="4462272"/>
           </a:xfrm>
         </p:spPr>
         <p:txBody>
@@ -5703,52 +5704,86 @@
           <a:lstStyle/>
           <a:p>
             <a:pPr marL="0" indent="0" algn="l">
+              <a:lnSpc>
+                <a:spcPct val="120000"/>
+              </a:lnSpc>
               <a:buNone/>
             </a:pPr>
             <a:r>
-              <a:rPr lang="en-US" sz="1600" dirty="0"/>
+              <a:rPr lang="en-US" sz="1800" dirty="0"/>
+              <a:t>Natural Language Processing (NLP Problems): Detecting Offense</a:t>
+            </a:r>
+          </a:p>
+          <a:p>
+            <a:pPr marL="0" indent="0">
+              <a:lnSpc>
+                <a:spcPct val="120000"/>
+              </a:lnSpc>
+              <a:buNone/>
+            </a:pPr>
+            <a:r>
+              <a:rPr lang="en-GB" sz="1800" dirty="0"/>
+              <a:t>In an NLP Problem, the textual data should be processed and transformed into appropriate datasets. Then, an initial exploratory data analysis should be carried out, along with different pre-processing and feature engineering techniques. The employed machine learning algorithms should be tested and compared (performance during learning, confusion matrix, precision, recall, accuracy, F1 measure) and the time spent to train/test the models.</a:t>
+            </a:r>
+            <a:endParaRPr lang="en-GB" sz="1800" b="0" i="0" dirty="0">
+              <a:effectLst/>
+            </a:endParaRPr>
+          </a:p>
+          <a:p>
+            <a:pPr marL="0" indent="0">
+              <a:lnSpc>
+                <a:spcPct val="120000"/>
+              </a:lnSpc>
+              <a:buNone/>
+            </a:pPr>
+            <a:r>
+              <a:rPr lang="en-US" sz="1800" dirty="0"/>
               <a:t>This project aims to identify </a:t>
             </a:r>
             <a:r>
-              <a:rPr lang="en-US" sz="1600" b="0" i="0" dirty="0">
+              <a:rPr lang="en-US" sz="1800" b="0" i="0" dirty="0">
                 <a:effectLst/>
               </a:rPr>
-              <a:t>to predict how offensive a text would be (for an average user) with values between 0 and 5. The score was calculated regardless of whether the text is classed as humorous or offensive overall. </a:t>
+              <a:t>how offensive a given text </a:t>
+            </a:r>
+            <a:r>
+              <a:rPr lang="en-US" sz="1800" dirty="0"/>
+              <a:t>is, by attributing a </a:t>
+            </a:r>
+            <a:r>
+              <a:rPr lang="en-US" sz="1800" b="0" i="0" dirty="0">
+                <a:effectLst/>
+              </a:rPr>
+              <a:t>score from 0 – 5 (5 being the most offensive).</a:t>
             </a:r>
           </a:p>
           <a:p>
             <a:pPr marL="0" indent="0" algn="l">
+              <a:lnSpc>
+                <a:spcPct val="120000"/>
+              </a:lnSpc>
               <a:buNone/>
             </a:pPr>
             <a:r>
-              <a:rPr lang="en-US" sz="1600" dirty="0"/>
+              <a:rPr lang="en-US" sz="1800" dirty="0"/>
               <a:t>The test file contains</a:t>
             </a:r>
             <a:r>
-              <a:rPr lang="en-US" sz="1600" b="0" i="0" dirty="0">
+              <a:rPr lang="en-US" sz="1800" b="0" i="0" dirty="0">
                 <a:effectLst/>
               </a:rPr>
               <a:t> labels and ratings from a balanced set of age groups from 18-70. </a:t>
             </a:r>
             <a:r>
-              <a:rPr lang="en-US" sz="1600" dirty="0"/>
+              <a:rPr lang="en-US" sz="1800" dirty="0"/>
               <a:t>The</a:t>
             </a:r>
             <a:r>
-              <a:rPr lang="en-US" sz="1600" b="0" i="0" dirty="0">
+              <a:rPr lang="en-US" sz="1800" b="0" i="0" dirty="0">
                 <a:effectLst/>
               </a:rPr>
               <a:t> annotators also represented a variety of genders, political stances and income levels. </a:t>
             </a:r>
-          </a:p>
-          <a:p>
-            <a:pPr marL="0" indent="0">
-              <a:buNone/>
-            </a:pPr>
-            <a:br>
-              <a:rPr lang="en-US" sz="1050" dirty="0"/>
-            </a:br>
-            <a:endParaRPr lang="en-US" sz="1400" dirty="0"/>
           </a:p>
         </p:txBody>
       </p:sp>
@@ -5796,7 +5831,7 @@
       </p:grpSpPr>
       <p:sp>
         <p:nvSpPr>
-          <p:cNvPr id="7" name="Título 6"/>
+          <p:cNvPr id="13" name="Título 12"/>
           <p:cNvSpPr>
             <a:spLocks noGrp="1"/>
           </p:cNvSpPr>
@@ -5811,52 +5846,123 @@
           <a:p>
             <a:pPr rtl="0"/>
             <a:r>
-              <a:rPr lang="pt-br" b="1" dirty="0"/>
-              <a:t>Tools </a:t>
-            </a:r>
-            <a:r>
-              <a:rPr lang="pt-br" b="1" dirty="0" err="1"/>
-              <a:t>and</a:t>
-            </a:r>
-            <a:r>
-              <a:rPr lang="pt-br" b="1" dirty="0"/>
-              <a:t> </a:t>
-            </a:r>
-            <a:r>
-              <a:rPr lang="pt-br" b="1" dirty="0" err="1"/>
-              <a:t>Algorithms</a:t>
-            </a:r>
-            <a:r>
-              <a:rPr lang="pt-br" b="1" dirty="0"/>
-              <a:t> </a:t>
-            </a:r>
+              <a:rPr lang="en-GB" sz="3600" b="1" dirty="0">
+                <a:solidFill>
+                  <a:srgbClr val="FFFFFF"/>
+                </a:solidFill>
+              </a:rPr>
+              <a:t>Related Work</a:t>
+            </a:r>
+            <a:endParaRPr lang="en-US" dirty="0"/>
           </a:p>
         </p:txBody>
       </p:sp>
       <p:sp>
         <p:nvSpPr>
-          <p:cNvPr id="8" name="Espaço Reservado para Texto 7"/>
+          <p:cNvPr id="14" name="Espaço Reservado para Conteúdo 13"/>
           <p:cNvSpPr>
             <a:spLocks noGrp="1"/>
           </p:cNvSpPr>
           <p:nvPr>
-            <p:ph type="body" idx="1"/>
+            <p:ph idx="1"/>
           </p:nvPr>
         </p:nvSpPr>
-        <p:spPr/>
+        <p:spPr>
+          <a:xfrm>
+            <a:off x="1218883" y="1700808"/>
+            <a:ext cx="10132113" cy="4462272"/>
+          </a:xfrm>
+        </p:spPr>
         <p:txBody>
-          <a:bodyPr rtlCol="0"/>
+          <a:bodyPr rtlCol="0">
+            <a:normAutofit/>
+          </a:bodyPr>
           <a:lstStyle/>
           <a:p>
-            <a:pPr rtl="0"/>
-            <a:endParaRPr lang="en-US" dirty="0"/>
+            <a:r>
+              <a:rPr lang="en-GB" sz="1800" b="0" i="0" u="none" strike="noStrike" dirty="0">
+                <a:effectLst/>
+              </a:rPr>
+              <a:t>Splitting into train, dev and test sets: </a:t>
+            </a:r>
+            <a:r>
+              <a:rPr lang="en-GB" sz="1800" b="0" i="0" u="none" strike="noStrike" dirty="0">
+                <a:effectLst/>
+                <a:hlinkClick r:id="rId2" tooltip="https://cs230.stanford.edu/blog/split/"/>
+              </a:rPr>
+              <a:t>https://cs230.stanford.edu/blog/split/</a:t>
+            </a:r>
+            <a:r>
+              <a:rPr lang="en-GB" sz="1800" b="0" i="0" u="none" strike="noStrike" dirty="0">
+                <a:effectLst/>
+              </a:rPr>
+              <a:t> </a:t>
+            </a:r>
+          </a:p>
+          <a:p>
+            <a:r>
+              <a:rPr lang="en-US" sz="1800" dirty="0"/>
+              <a:t>N-Grams: </a:t>
+            </a:r>
+            <a:r>
+              <a:rPr lang="en-GB" sz="1800" b="0" i="0" u="none" strike="noStrike" dirty="0">
+                <a:effectLst/>
+                <a:hlinkClick r:id="rId3" tooltip="https://www.lexalytics.com/lexablog/context-analysis-nlp"/>
+              </a:rPr>
+              <a:t>https://www.lexalytics.com/lexablog/context-analysis-nlp</a:t>
+            </a:r>
+            <a:endParaRPr lang="en-GB" sz="1800" b="0" i="0" u="none" strike="noStrike" dirty="0">
+              <a:effectLst/>
+            </a:endParaRPr>
+          </a:p>
+          <a:p>
+            <a:r>
+              <a:rPr lang="en-US" sz="1800" dirty="0"/>
+              <a:t>Synonyms/Antonyms and POS: </a:t>
+            </a:r>
+            <a:r>
+              <a:rPr lang="en-GB" sz="1800" b="0" i="0" u="sng" dirty="0">
+                <a:effectLst/>
+                <a:hlinkClick r:id="rId4" tooltip="https://www.journaldev.com/46194/natural-language-processing-tasks"/>
+              </a:rPr>
+              <a:t>https://www.journaldev.com/46194/natural-language-processing-tasks</a:t>
+            </a:r>
+            <a:endParaRPr lang="en-GB" sz="1800" b="0" i="0" u="sng" dirty="0">
+              <a:effectLst/>
+            </a:endParaRPr>
+          </a:p>
+          <a:p>
+            <a:r>
+              <a:rPr lang="en-US" sz="1800" dirty="0"/>
+              <a:t>“</a:t>
+            </a:r>
+            <a:r>
+              <a:rPr lang="en-GB" sz="1800" dirty="0"/>
+              <a:t>Method for Detecting and Rating </a:t>
+            </a:r>
+            <a:r>
+              <a:rPr lang="en-GB" sz="1800" dirty="0" err="1"/>
+              <a:t>Humor</a:t>
+            </a:r>
+            <a:r>
+              <a:rPr lang="en-GB" sz="1800" dirty="0"/>
+              <a:t> Based on Multi-Task Adversarial Training”: </a:t>
+            </a:r>
+            <a:r>
+              <a:rPr lang="en-GB" sz="1800" b="0" i="0" u="none" strike="noStrike" dirty="0">
+                <a:effectLst/>
+                <a:hlinkClick r:id="rId5" tooltip="https://arxiv.org/pdf/2104.10336v1.pdf"/>
+              </a:rPr>
+              <a:t>https://arxiv.org/pdf/2104.10336v1.pdf</a:t>
+            </a:r>
+            <a:endParaRPr lang="en-GB" sz="1800" dirty="0"/>
           </a:p>
         </p:txBody>
       </p:sp>
     </p:spTree>
     <p:extLst>
       <p:ext uri="{BB962C8B-B14F-4D97-AF65-F5344CB8AC3E}">
-        <p14:creationId xmlns:p14="http://schemas.microsoft.com/office/powerpoint/2010/main" val="2672039197"/>
+        <p14:creationId xmlns:p14="http://schemas.microsoft.com/office/powerpoint/2010/main" val="3832841480"/>
       </p:ext>
     </p:extLst>
   </p:cSld>
@@ -5897,6 +6003,249 @@
       </p:grpSpPr>
       <p:sp>
         <p:nvSpPr>
+          <p:cNvPr id="7" name="Título 6"/>
+          <p:cNvSpPr>
+            <a:spLocks noGrp="1"/>
+          </p:cNvSpPr>
+          <p:nvPr>
+            <p:ph type="title"/>
+          </p:nvPr>
+        </p:nvSpPr>
+        <p:spPr>
+          <a:xfrm>
+            <a:off x="1197869" y="274637"/>
+            <a:ext cx="10360501" cy="1223963"/>
+          </a:xfrm>
+        </p:spPr>
+        <p:txBody>
+          <a:bodyPr rtlCol="0"/>
+          <a:lstStyle/>
+          <a:p>
+            <a:pPr rtl="0"/>
+            <a:r>
+              <a:rPr lang="pt-br" b="1" dirty="0"/>
+              <a:t>Tools </a:t>
+            </a:r>
+            <a:r>
+              <a:rPr lang="pt-br" b="1" dirty="0" err="1"/>
+              <a:t>and</a:t>
+            </a:r>
+            <a:r>
+              <a:rPr lang="pt-br" b="1" dirty="0"/>
+              <a:t> </a:t>
+            </a:r>
+            <a:r>
+              <a:rPr lang="pt-br" b="1" dirty="0" err="1"/>
+              <a:t>Algorithms</a:t>
+            </a:r>
+            <a:r>
+              <a:rPr lang="pt-br" b="1" dirty="0"/>
+              <a:t> </a:t>
+            </a:r>
+          </a:p>
+        </p:txBody>
+      </p:sp>
+      <p:sp>
+        <p:nvSpPr>
+          <p:cNvPr id="3" name="TextBox 2">
+            <a:extLst>
+              <a:ext uri="{FF2B5EF4-FFF2-40B4-BE49-F238E27FC236}">
+                <a16:creationId xmlns:a16="http://schemas.microsoft.com/office/drawing/2014/main" id="{2A0EE605-79BA-4134-B6AE-02E17A1B47E8}"/>
+              </a:ext>
+            </a:extLst>
+          </p:cNvPr>
+          <p:cNvSpPr txBox="1"/>
+          <p:nvPr/>
+        </p:nvSpPr>
+        <p:spPr>
+          <a:xfrm>
+            <a:off x="1192344" y="1916832"/>
+            <a:ext cx="10060105" cy="4247317"/>
+          </a:xfrm>
+          <a:prstGeom prst="rect">
+            <a:avLst/>
+          </a:prstGeom>
+          <a:noFill/>
+        </p:spPr>
+        <p:txBody>
+          <a:bodyPr wrap="square" rtlCol="0">
+            <a:spAutoFit/>
+          </a:bodyPr>
+          <a:lstStyle/>
+          <a:p>
+            <a:r>
+              <a:rPr lang="en-GB" sz="1800" dirty="0"/>
+              <a:t>Machine learning algorithms:</a:t>
+            </a:r>
+          </a:p>
+          <a:p>
+            <a:pPr marL="285750" indent="-285750">
+              <a:buFont typeface="Arial" panose="020B0604020202020204" pitchFamily="34" charset="0"/>
+              <a:buChar char="•"/>
+            </a:pPr>
+            <a:r>
+              <a:rPr lang="en-GB" sz="1800" dirty="0"/>
+              <a:t>SVM</a:t>
+            </a:r>
+          </a:p>
+          <a:p>
+            <a:pPr marL="285750" indent="-285750">
+              <a:buFont typeface="Arial" panose="020B0604020202020204" pitchFamily="34" charset="0"/>
+              <a:buChar char="•"/>
+            </a:pPr>
+            <a:r>
+              <a:rPr lang="en-GB" sz="1800" dirty="0"/>
+              <a:t>Neural Networks</a:t>
+            </a:r>
+          </a:p>
+          <a:p>
+            <a:pPr marL="285750" indent="-285750">
+              <a:buFont typeface="Arial" panose="020B0604020202020204" pitchFamily="34" charset="0"/>
+              <a:buChar char="•"/>
+            </a:pPr>
+            <a:r>
+              <a:rPr lang="en-GB" sz="1800" dirty="0"/>
+              <a:t>Logistic Regression</a:t>
+            </a:r>
+          </a:p>
+          <a:p>
+            <a:endParaRPr lang="en-GB" sz="1800" dirty="0"/>
+          </a:p>
+          <a:p>
+            <a:r>
+              <a:rPr lang="en-GB" sz="1800" dirty="0"/>
+              <a:t>Pre-processing of data:</a:t>
+            </a:r>
+          </a:p>
+          <a:p>
+            <a:pPr marL="285750" indent="-285750">
+              <a:buFont typeface="Arial" panose="020B0604020202020204" pitchFamily="34" charset="0"/>
+              <a:buChar char="•"/>
+            </a:pPr>
+            <a:r>
+              <a:rPr lang="en-GB" sz="1800" dirty="0"/>
+              <a:t>Porter Stemmer</a:t>
+            </a:r>
+          </a:p>
+          <a:p>
+            <a:pPr marL="285750" indent="-285750">
+              <a:buFont typeface="Arial" panose="020B0604020202020204" pitchFamily="34" charset="0"/>
+              <a:buChar char="•"/>
+            </a:pPr>
+            <a:r>
+              <a:rPr lang="en-GB" sz="1800" dirty="0"/>
+              <a:t>Bag of words</a:t>
+            </a:r>
+          </a:p>
+          <a:p>
+            <a:pPr marL="285750" indent="-285750">
+              <a:buFont typeface="Arial" panose="020B0604020202020204" pitchFamily="34" charset="0"/>
+              <a:buChar char="•"/>
+            </a:pPr>
+            <a:r>
+              <a:rPr lang="en-GB" sz="1800" dirty="0"/>
+              <a:t>Part of Speech (POS)</a:t>
+            </a:r>
+          </a:p>
+          <a:p>
+            <a:pPr marL="285750" indent="-285750">
+              <a:buFont typeface="Arial" panose="020B0604020202020204" pitchFamily="34" charset="0"/>
+              <a:buChar char="•"/>
+            </a:pPr>
+            <a:r>
+              <a:rPr lang="en-GB" sz="1800" dirty="0"/>
+              <a:t>Handling negation</a:t>
+            </a:r>
+          </a:p>
+          <a:p>
+            <a:pPr marL="285750" indent="-285750">
+              <a:buFont typeface="Arial" panose="020B0604020202020204" pitchFamily="34" charset="0"/>
+              <a:buChar char="•"/>
+            </a:pPr>
+            <a:r>
+              <a:rPr lang="en-GB" sz="1800" dirty="0"/>
+              <a:t>Synonyms/Antonyms</a:t>
+            </a:r>
+          </a:p>
+          <a:p>
+            <a:pPr marL="285750" indent="-285750">
+              <a:buFont typeface="Arial" panose="020B0604020202020204" pitchFamily="34" charset="0"/>
+              <a:buChar char="•"/>
+            </a:pPr>
+            <a:r>
+              <a:rPr lang="en-GB" sz="1800" dirty="0"/>
+              <a:t>N-grams</a:t>
+            </a:r>
+          </a:p>
+          <a:p>
+            <a:pPr marL="285750" indent="-285750">
+              <a:buFont typeface="Arial" panose="020B0604020202020204" pitchFamily="34" charset="0"/>
+              <a:buChar char="•"/>
+            </a:pPr>
+            <a:r>
+              <a:rPr lang="en-GB" sz="1800" dirty="0"/>
+              <a:t>Slang data sheet</a:t>
+            </a:r>
+          </a:p>
+          <a:p>
+            <a:pPr marL="285750" indent="-285750">
+              <a:buFont typeface="Arial" panose="020B0604020202020204" pitchFamily="34" charset="0"/>
+              <a:buChar char="•"/>
+            </a:pPr>
+            <a:endParaRPr lang="en-GB" sz="1800" dirty="0"/>
+          </a:p>
+          <a:p>
+            <a:r>
+              <a:rPr lang="en-GB" sz="1800" dirty="0"/>
+              <a:t>Import of ‘transformers’ library to use the BERT Pre-Trained Language Model?</a:t>
+            </a:r>
+          </a:p>
+        </p:txBody>
+      </p:sp>
+    </p:spTree>
+    <p:extLst>
+      <p:ext uri="{BB962C8B-B14F-4D97-AF65-F5344CB8AC3E}">
+        <p14:creationId xmlns:p14="http://schemas.microsoft.com/office/powerpoint/2010/main" val="2672039197"/>
+      </p:ext>
+    </p:extLst>
+  </p:cSld>
+  <p:clrMapOvr>
+    <a:masterClrMapping/>
+  </p:clrMapOvr>
+  <mc:AlternateContent xmlns:mc="http://schemas.openxmlformats.org/markup-compatibility/2006" xmlns:p14="http://schemas.microsoft.com/office/powerpoint/2010/main">
+    <mc:Choice Requires="p14">
+      <p:transition spd="med" p14:dur="700">
+        <p:fade/>
+      </p:transition>
+    </mc:Choice>
+    <mc:Fallback xmlns="">
+      <p:transition spd="med">
+        <p:fade/>
+      </p:transition>
+    </mc:Fallback>
+  </mc:AlternateContent>
+</p:sld>
+</file>
+
+<file path=ppt/slides/slide5.xml><?xml version="1.0" encoding="utf-8"?>
+<p:sld xmlns:a="http://schemas.openxmlformats.org/drawingml/2006/main" xmlns:r="http://schemas.openxmlformats.org/officeDocument/2006/relationships" xmlns:p="http://schemas.openxmlformats.org/presentationml/2006/main">
+  <p:cSld>
+    <p:spTree>
+      <p:nvGrpSpPr>
+        <p:cNvPr id="1" name=""/>
+        <p:cNvGrpSpPr/>
+        <p:nvPr/>
+      </p:nvGrpSpPr>
+      <p:grpSpPr>
+        <a:xfrm>
+          <a:off x="0" y="0"/>
+          <a:ext cx="0" cy="0"/>
+          <a:chOff x="0" y="0"/>
+          <a:chExt cx="0" cy="0"/>
+        </a:xfrm>
+      </p:grpSpPr>
+      <p:sp>
+        <p:nvSpPr>
           <p:cNvPr id="2" name="Título 1">
             <a:extLst>
               <a:ext uri="{FF2B5EF4-FFF2-40B4-BE49-F238E27FC236}">
@@ -5930,45 +6279,42 @@
       </p:sp>
       <p:sp>
         <p:nvSpPr>
-          <p:cNvPr id="3" name="Espaço Reservado para Texto 2">
+          <p:cNvPr id="6" name="TextBox 5">
             <a:extLst>
               <a:ext uri="{FF2B5EF4-FFF2-40B4-BE49-F238E27FC236}">
-                <a16:creationId xmlns:a16="http://schemas.microsoft.com/office/drawing/2014/main" id="{9D2C63CC-DA3F-478B-95F7-DE6DC0F7D908}"/>
+                <a16:creationId xmlns:a16="http://schemas.microsoft.com/office/drawing/2014/main" id="{05A39330-1785-43E7-ADF4-222CB5A56867}"/>
               </a:ext>
             </a:extLst>
           </p:cNvPr>
-          <p:cNvSpPr>
-            <a:spLocks noGrp="1"/>
-          </p:cNvSpPr>
-          <p:nvPr>
-            <p:ph type="body" idx="1"/>
-          </p:nvPr>
+          <p:cNvSpPr txBox="1"/>
+          <p:nvPr/>
         </p:nvSpPr>
         <p:spPr>
           <a:xfrm>
-            <a:off x="1125860" y="1772816"/>
-            <a:ext cx="5082740" cy="359048"/>
+            <a:off x="1197868" y="1916832"/>
+            <a:ext cx="10060105" cy="923330"/>
           </a:xfrm>
+          <a:prstGeom prst="rect">
+            <a:avLst/>
+          </a:prstGeom>
+          <a:noFill/>
         </p:spPr>
         <p:txBody>
-          <a:bodyPr>
-            <a:normAutofit/>
+          <a:bodyPr wrap="square" rtlCol="0">
+            <a:spAutoFit/>
           </a:bodyPr>
           <a:lstStyle/>
           <a:p>
             <a:r>
-              <a:rPr lang="en-GB" sz="1400" dirty="0">
-                <a:solidFill>
-                  <a:schemeClr val="tx1"/>
-                </a:solidFill>
-              </a:rPr>
-              <a:t>The language of choice is Python</a:t>
-            </a:r>
-            <a:endParaRPr lang="pt-BR" sz="1400" dirty="0">
-              <a:solidFill>
-                <a:schemeClr val="tx1"/>
-              </a:solidFill>
-            </a:endParaRPr>
+              <a:rPr lang="en-GB" sz="1800" dirty="0"/>
+              <a:t>Language of choice is Python.</a:t>
+            </a:r>
+          </a:p>
+          <a:p>
+            <a:endParaRPr lang="en-GB" sz="1800" dirty="0"/>
+          </a:p>
+          <a:p>
+            <a:endParaRPr lang="en-GB" sz="1800" dirty="0"/>
           </a:p>
         </p:txBody>
       </p:sp>
@@ -6948,12 +7294,139 @@
 </file>
 
 <file path=customXml/item1.xml><?xml version="1.0" encoding="utf-8"?>
-<?mso-contentType ?>
-<FormTemplates xmlns="http://schemas.microsoft.com/sharepoint/v3/contenttype/forms">
-  <Display>DocumentLibraryForm</Display>
-  <Edit>AssetEditForm</Edit>
-  <New>DocumentLibraryForm</New>
-</FormTemplates>
+<p:properties xmlns:p="http://schemas.microsoft.com/office/2006/metadata/properties" xmlns:xsi="http://www.w3.org/2001/XMLSchema-instance" xmlns:pc="http://schemas.microsoft.com/office/infopath/2007/PartnerControls">
+  <documentManagement>
+    <LocPublishedLinkedAssetsLookup xmlns="4873beb7-5857-4685-be1f-d57550cc96cc" xsi:nil="true"/>
+    <ApprovalStatus xmlns="4873beb7-5857-4685-be1f-d57550cc96cc">InProgress</ApprovalStatus>
+    <MarketSpecific xmlns="4873beb7-5857-4685-be1f-d57550cc96cc">false</MarketSpecific>
+    <LocComments xmlns="4873beb7-5857-4685-be1f-d57550cc96cc" xsi:nil="true"/>
+    <LocLastLocAttemptVersionTypeLookup xmlns="4873beb7-5857-4685-be1f-d57550cc96cc" xsi:nil="true"/>
+    <DirectSourceMarket xmlns="4873beb7-5857-4685-be1f-d57550cc96cc" xsi:nil="true"/>
+    <ThumbnailAssetId xmlns="4873beb7-5857-4685-be1f-d57550cc96cc" xsi:nil="true"/>
+    <PrimaryImageGen xmlns="4873beb7-5857-4685-be1f-d57550cc96cc">false</PrimaryImageGen>
+    <LocNewPublishedVersionLookup xmlns="4873beb7-5857-4685-be1f-d57550cc96cc" xsi:nil="true"/>
+    <LegacyData xmlns="4873beb7-5857-4685-be1f-d57550cc96cc" xsi:nil="true"/>
+    <LocRecommendedHandoff xmlns="4873beb7-5857-4685-be1f-d57550cc96cc" xsi:nil="true"/>
+    <BusinessGroup xmlns="4873beb7-5857-4685-be1f-d57550cc96cc" xsi:nil="true"/>
+    <BlockPublish xmlns="4873beb7-5857-4685-be1f-d57550cc96cc">false</BlockPublish>
+    <TPFriendlyName xmlns="4873beb7-5857-4685-be1f-d57550cc96cc" xsi:nil="true"/>
+    <LocOverallPublishStatusLookup xmlns="4873beb7-5857-4685-be1f-d57550cc96cc" xsi:nil="true"/>
+    <NumericId xmlns="4873beb7-5857-4685-be1f-d57550cc96cc" xsi:nil="true"/>
+    <APEditor xmlns="4873beb7-5857-4685-be1f-d57550cc96cc">
+      <UserInfo>
+        <DisplayName/>
+        <AccountId xsi:nil="true"/>
+        <AccountType/>
+      </UserInfo>
+    </APEditor>
+    <SourceTitle xmlns="4873beb7-5857-4685-be1f-d57550cc96cc" xsi:nil="true"/>
+    <OpenTemplate xmlns="4873beb7-5857-4685-be1f-d57550cc96cc">true</OpenTemplate>
+    <LocOverallLocStatusLookup xmlns="4873beb7-5857-4685-be1f-d57550cc96cc" xsi:nil="true"/>
+    <UALocComments xmlns="4873beb7-5857-4685-be1f-d57550cc96cc" xsi:nil="true"/>
+    <ParentAssetId xmlns="4873beb7-5857-4685-be1f-d57550cc96cc" xsi:nil="true"/>
+    <IntlLangReviewDate xmlns="4873beb7-5857-4685-be1f-d57550cc96cc" xsi:nil="true"/>
+    <FeatureTagsTaxHTField0 xmlns="4873beb7-5857-4685-be1f-d57550cc96cc">
+      <Terms xmlns="http://schemas.microsoft.com/office/infopath/2007/PartnerControls"/>
+    </FeatureTagsTaxHTField0>
+    <PublishStatusLookup xmlns="4873beb7-5857-4685-be1f-d57550cc96cc">
+      <Value>1345093</Value>
+    </PublishStatusLookup>
+    <Providers xmlns="4873beb7-5857-4685-be1f-d57550cc96cc" xsi:nil="true"/>
+    <MachineTranslated xmlns="4873beb7-5857-4685-be1f-d57550cc96cc">false</MachineTranslated>
+    <OriginalSourceMarket xmlns="4873beb7-5857-4685-be1f-d57550cc96cc" xsi:nil="true"/>
+    <APDescription xmlns="4873beb7-5857-4685-be1f-d57550cc96cc">This simple template design works for technology and  businesses, but it's versatile enough to use in other contexts.  It features multiple slide layouts designed for widescreen (16x9 resolution) and includes a sample SmartArt list and chart that are easily editable.</APDescription>
+    <ClipArtFilename xmlns="4873beb7-5857-4685-be1f-d57550cc96cc" xsi:nil="true"/>
+    <ContentItem xmlns="4873beb7-5857-4685-be1f-d57550cc96cc" xsi:nil="true"/>
+    <TPInstallLocation xmlns="4873beb7-5857-4685-be1f-d57550cc96cc" xsi:nil="true"/>
+    <PublishTargets xmlns="4873beb7-5857-4685-be1f-d57550cc96cc">OfficeOnlineVNext</PublishTargets>
+    <TimesCloned xmlns="4873beb7-5857-4685-be1f-d57550cc96cc" xsi:nil="true"/>
+    <AssetStart xmlns="4873beb7-5857-4685-be1f-d57550cc96cc">2011-11-26T00:30:00+00:00</AssetStart>
+    <Provider xmlns="4873beb7-5857-4685-be1f-d57550cc96cc" xsi:nil="true"/>
+    <AcquiredFrom xmlns="4873beb7-5857-4685-be1f-d57550cc96cc">Internal MS</AcquiredFrom>
+    <FriendlyTitle xmlns="4873beb7-5857-4685-be1f-d57550cc96cc" xsi:nil="true"/>
+    <LastHandOff xmlns="4873beb7-5857-4685-be1f-d57550cc96cc" xsi:nil="true"/>
+    <TPClientViewer xmlns="4873beb7-5857-4685-be1f-d57550cc96cc" xsi:nil="true"/>
+    <TemplateStatus xmlns="4873beb7-5857-4685-be1f-d57550cc96cc">Complete</TemplateStatus>
+    <Downloads xmlns="4873beb7-5857-4685-be1f-d57550cc96cc">0</Downloads>
+    <OOCacheId xmlns="4873beb7-5857-4685-be1f-d57550cc96cc" xsi:nil="true"/>
+    <IsDeleted xmlns="4873beb7-5857-4685-be1f-d57550cc96cc">false</IsDeleted>
+    <LocPublishedDependentAssetsLookup xmlns="4873beb7-5857-4685-be1f-d57550cc96cc" xsi:nil="true"/>
+    <TPExecutable xmlns="4873beb7-5857-4685-be1f-d57550cc96cc" xsi:nil="true"/>
+    <EditorialTags xmlns="4873beb7-5857-4685-be1f-d57550cc96cc" xsi:nil="true"/>
+    <SubmitterId xmlns="4873beb7-5857-4685-be1f-d57550cc96cc" xsi:nil="true"/>
+    <ApprovalLog xmlns="4873beb7-5857-4685-be1f-d57550cc96cc" xsi:nil="true"/>
+    <AssetType xmlns="4873beb7-5857-4685-be1f-d57550cc96cc">TP</AssetType>
+    <BugNumber xmlns="4873beb7-5857-4685-be1f-d57550cc96cc" xsi:nil="true"/>
+    <CSXSubmissionDate xmlns="4873beb7-5857-4685-be1f-d57550cc96cc" xsi:nil="true"/>
+    <CSXUpdate xmlns="4873beb7-5857-4685-be1f-d57550cc96cc">false</CSXUpdate>
+    <Milestone xmlns="4873beb7-5857-4685-be1f-d57550cc96cc" xsi:nil="true"/>
+    <RecommendationsModifier xmlns="4873beb7-5857-4685-be1f-d57550cc96cc" xsi:nil="true"/>
+    <OriginAsset xmlns="4873beb7-5857-4685-be1f-d57550cc96cc" xsi:nil="true"/>
+    <TPComponent xmlns="4873beb7-5857-4685-be1f-d57550cc96cc" xsi:nil="true"/>
+    <AssetId xmlns="4873beb7-5857-4685-be1f-d57550cc96cc">TP102787989</AssetId>
+    <IntlLocPriority xmlns="4873beb7-5857-4685-be1f-d57550cc96cc" xsi:nil="true"/>
+    <PolicheckWords xmlns="4873beb7-5857-4685-be1f-d57550cc96cc" xsi:nil="true"/>
+    <TPLaunchHelpLink xmlns="4873beb7-5857-4685-be1f-d57550cc96cc" xsi:nil="true"/>
+    <TPApplication xmlns="4873beb7-5857-4685-be1f-d57550cc96cc" xsi:nil="true"/>
+    <CrawlForDependencies xmlns="4873beb7-5857-4685-be1f-d57550cc96cc">false</CrawlForDependencies>
+    <HandoffToMSDN xmlns="4873beb7-5857-4685-be1f-d57550cc96cc" xsi:nil="true"/>
+    <PlannedPubDate xmlns="4873beb7-5857-4685-be1f-d57550cc96cc" xsi:nil="true"/>
+    <IntlLangReviewer xmlns="4873beb7-5857-4685-be1f-d57550cc96cc" xsi:nil="true"/>
+    <TrustLevel xmlns="4873beb7-5857-4685-be1f-d57550cc96cc">1 Microsoft Managed Content</TrustLevel>
+    <LocLastLocAttemptVersionLookup xmlns="4873beb7-5857-4685-be1f-d57550cc96cc">694266</LocLastLocAttemptVersionLookup>
+    <LocProcessedForHandoffsLookup xmlns="4873beb7-5857-4685-be1f-d57550cc96cc" xsi:nil="true"/>
+    <IsSearchable xmlns="4873beb7-5857-4685-be1f-d57550cc96cc">true</IsSearchable>
+    <TemplateTemplateType xmlns="4873beb7-5857-4685-be1f-d57550cc96cc">PowerPoint Presentation Template</TemplateTemplateType>
+    <CampaignTagsTaxHTField0 xmlns="4873beb7-5857-4685-be1f-d57550cc96cc">
+      <Terms xmlns="http://schemas.microsoft.com/office/infopath/2007/PartnerControls"/>
+    </CampaignTagsTaxHTField0>
+    <TPNamespace xmlns="4873beb7-5857-4685-be1f-d57550cc96cc" xsi:nil="true"/>
+    <LocOverallPreviewStatusLookup xmlns="4873beb7-5857-4685-be1f-d57550cc96cc" xsi:nil="true"/>
+    <TaxCatchAll xmlns="4873beb7-5857-4685-be1f-d57550cc96cc"/>
+    <Markets xmlns="4873beb7-5857-4685-be1f-d57550cc96cc"/>
+    <UAProjectedTotalWords xmlns="4873beb7-5857-4685-be1f-d57550cc96cc" xsi:nil="true"/>
+    <IntlLangReview xmlns="4873beb7-5857-4685-be1f-d57550cc96cc" xsi:nil="true"/>
+    <OutputCachingOn xmlns="4873beb7-5857-4685-be1f-d57550cc96cc">false</OutputCachingOn>
+    <AverageRating xmlns="4873beb7-5857-4685-be1f-d57550cc96cc" xsi:nil="true"/>
+    <APAuthor xmlns="4873beb7-5857-4685-be1f-d57550cc96cc">
+      <UserInfo>
+        <DisplayName>REDMOND\kristaa</DisplayName>
+        <AccountId>136</AccountId>
+        <AccountType/>
+      </UserInfo>
+    </APAuthor>
+    <LocManualTestRequired xmlns="4873beb7-5857-4685-be1f-d57550cc96cc">false</LocManualTestRequired>
+    <TPCommandLine xmlns="4873beb7-5857-4685-be1f-d57550cc96cc" xsi:nil="true"/>
+    <TPAppVersion xmlns="4873beb7-5857-4685-be1f-d57550cc96cc" xsi:nil="true"/>
+    <EditorialStatus xmlns="4873beb7-5857-4685-be1f-d57550cc96cc">Complete</EditorialStatus>
+    <LastModifiedDateTime xmlns="4873beb7-5857-4685-be1f-d57550cc96cc" xsi:nil="true"/>
+    <ScenarioTagsTaxHTField0 xmlns="4873beb7-5857-4685-be1f-d57550cc96cc">
+      <Terms xmlns="http://schemas.microsoft.com/office/infopath/2007/PartnerControls"/>
+    </ScenarioTagsTaxHTField0>
+    <LocProcessedForMarketsLookup xmlns="4873beb7-5857-4685-be1f-d57550cc96cc" xsi:nil="true"/>
+    <TPLaunchHelpLinkType xmlns="4873beb7-5857-4685-be1f-d57550cc96cc">Template</TPLaunchHelpLinkType>
+    <OriginalRelease xmlns="4873beb7-5857-4685-be1f-d57550cc96cc">15</OriginalRelease>
+    <LocalizationTagsTaxHTField0 xmlns="4873beb7-5857-4685-be1f-d57550cc96cc">
+      <Terms xmlns="http://schemas.microsoft.com/office/infopath/2007/PartnerControls"/>
+    </LocalizationTagsTaxHTField0>
+    <UACurrentWords xmlns="4873beb7-5857-4685-be1f-d57550cc96cc" xsi:nil="true"/>
+    <ArtSampleDocs xmlns="4873beb7-5857-4685-be1f-d57550cc96cc" xsi:nil="true"/>
+    <UALocRecommendation xmlns="4873beb7-5857-4685-be1f-d57550cc96cc">Localize</UALocRecommendation>
+    <Manager xmlns="4873beb7-5857-4685-be1f-d57550cc96cc" xsi:nil="true"/>
+    <LocOverallHandbackStatusLookup xmlns="4873beb7-5857-4685-be1f-d57550cc96cc" xsi:nil="true"/>
+    <ShowIn xmlns="4873beb7-5857-4685-be1f-d57550cc96cc">Show everywhere</ShowIn>
+    <UANotes xmlns="4873beb7-5857-4685-be1f-d57550cc96cc" xsi:nil="true"/>
+    <InternalTagsTaxHTField0 xmlns="4873beb7-5857-4685-be1f-d57550cc96cc">
+      <Terms xmlns="http://schemas.microsoft.com/office/infopath/2007/PartnerControls"/>
+    </InternalTagsTaxHTField0>
+    <CSXHash xmlns="4873beb7-5857-4685-be1f-d57550cc96cc" xsi:nil="true"/>
+    <VoteCount xmlns="4873beb7-5857-4685-be1f-d57550cc96cc" xsi:nil="true"/>
+    <AssetExpire xmlns="4873beb7-5857-4685-be1f-d57550cc96cc">2029-05-12T07:00:00+00:00</AssetExpire>
+    <DSATActionTaken xmlns="4873beb7-5857-4685-be1f-d57550cc96cc" xsi:nil="true"/>
+    <CSXSubmissionMarket xmlns="4873beb7-5857-4685-be1f-d57550cc96cc" xsi:nil="true"/>
+    <LocMarketGroupTiers2 xmlns="4873beb7-5857-4685-be1f-d57550cc96cc" xsi:nil="true"/>
+  </documentManagement>
+</p:properties>
 </file>
 
 <file path=customXml/item2.xml><?xml version="1.0" encoding="utf-8"?>
@@ -7997,145 +8470,26 @@
 </file>
 
 <file path=customXml/item3.xml><?xml version="1.0" encoding="utf-8"?>
-<p:properties xmlns:p="http://schemas.microsoft.com/office/2006/metadata/properties" xmlns:xsi="http://www.w3.org/2001/XMLSchema-instance" xmlns:pc="http://schemas.microsoft.com/office/infopath/2007/PartnerControls">
-  <documentManagement>
-    <LocPublishedLinkedAssetsLookup xmlns="4873beb7-5857-4685-be1f-d57550cc96cc" xsi:nil="true"/>
-    <ApprovalStatus xmlns="4873beb7-5857-4685-be1f-d57550cc96cc">InProgress</ApprovalStatus>
-    <MarketSpecific xmlns="4873beb7-5857-4685-be1f-d57550cc96cc">false</MarketSpecific>
-    <LocComments xmlns="4873beb7-5857-4685-be1f-d57550cc96cc" xsi:nil="true"/>
-    <LocLastLocAttemptVersionTypeLookup xmlns="4873beb7-5857-4685-be1f-d57550cc96cc" xsi:nil="true"/>
-    <DirectSourceMarket xmlns="4873beb7-5857-4685-be1f-d57550cc96cc" xsi:nil="true"/>
-    <ThumbnailAssetId xmlns="4873beb7-5857-4685-be1f-d57550cc96cc" xsi:nil="true"/>
-    <PrimaryImageGen xmlns="4873beb7-5857-4685-be1f-d57550cc96cc">false</PrimaryImageGen>
-    <LocNewPublishedVersionLookup xmlns="4873beb7-5857-4685-be1f-d57550cc96cc" xsi:nil="true"/>
-    <LegacyData xmlns="4873beb7-5857-4685-be1f-d57550cc96cc" xsi:nil="true"/>
-    <LocRecommendedHandoff xmlns="4873beb7-5857-4685-be1f-d57550cc96cc" xsi:nil="true"/>
-    <BusinessGroup xmlns="4873beb7-5857-4685-be1f-d57550cc96cc" xsi:nil="true"/>
-    <BlockPublish xmlns="4873beb7-5857-4685-be1f-d57550cc96cc">false</BlockPublish>
-    <TPFriendlyName xmlns="4873beb7-5857-4685-be1f-d57550cc96cc" xsi:nil="true"/>
-    <LocOverallPublishStatusLookup xmlns="4873beb7-5857-4685-be1f-d57550cc96cc" xsi:nil="true"/>
-    <NumericId xmlns="4873beb7-5857-4685-be1f-d57550cc96cc" xsi:nil="true"/>
-    <APEditor xmlns="4873beb7-5857-4685-be1f-d57550cc96cc">
-      <UserInfo>
-        <DisplayName/>
-        <AccountId xsi:nil="true"/>
-        <AccountType/>
-      </UserInfo>
-    </APEditor>
-    <SourceTitle xmlns="4873beb7-5857-4685-be1f-d57550cc96cc" xsi:nil="true"/>
-    <OpenTemplate xmlns="4873beb7-5857-4685-be1f-d57550cc96cc">true</OpenTemplate>
-    <LocOverallLocStatusLookup xmlns="4873beb7-5857-4685-be1f-d57550cc96cc" xsi:nil="true"/>
-    <UALocComments xmlns="4873beb7-5857-4685-be1f-d57550cc96cc" xsi:nil="true"/>
-    <ParentAssetId xmlns="4873beb7-5857-4685-be1f-d57550cc96cc" xsi:nil="true"/>
-    <IntlLangReviewDate xmlns="4873beb7-5857-4685-be1f-d57550cc96cc" xsi:nil="true"/>
-    <FeatureTagsTaxHTField0 xmlns="4873beb7-5857-4685-be1f-d57550cc96cc">
-      <Terms xmlns="http://schemas.microsoft.com/office/infopath/2007/PartnerControls"/>
-    </FeatureTagsTaxHTField0>
-    <PublishStatusLookup xmlns="4873beb7-5857-4685-be1f-d57550cc96cc">
-      <Value>1345093</Value>
-    </PublishStatusLookup>
-    <Providers xmlns="4873beb7-5857-4685-be1f-d57550cc96cc" xsi:nil="true"/>
-    <MachineTranslated xmlns="4873beb7-5857-4685-be1f-d57550cc96cc">false</MachineTranslated>
-    <OriginalSourceMarket xmlns="4873beb7-5857-4685-be1f-d57550cc96cc" xsi:nil="true"/>
-    <APDescription xmlns="4873beb7-5857-4685-be1f-d57550cc96cc">This simple template design works for technology and  businesses, but it's versatile enough to use in other contexts.  It features multiple slide layouts designed for widescreen (16x9 resolution) and includes a sample SmartArt list and chart that are easily editable.</APDescription>
-    <ClipArtFilename xmlns="4873beb7-5857-4685-be1f-d57550cc96cc" xsi:nil="true"/>
-    <ContentItem xmlns="4873beb7-5857-4685-be1f-d57550cc96cc" xsi:nil="true"/>
-    <TPInstallLocation xmlns="4873beb7-5857-4685-be1f-d57550cc96cc" xsi:nil="true"/>
-    <PublishTargets xmlns="4873beb7-5857-4685-be1f-d57550cc96cc">OfficeOnlineVNext</PublishTargets>
-    <TimesCloned xmlns="4873beb7-5857-4685-be1f-d57550cc96cc" xsi:nil="true"/>
-    <AssetStart xmlns="4873beb7-5857-4685-be1f-d57550cc96cc">2011-11-26T00:30:00+00:00</AssetStart>
-    <Provider xmlns="4873beb7-5857-4685-be1f-d57550cc96cc" xsi:nil="true"/>
-    <AcquiredFrom xmlns="4873beb7-5857-4685-be1f-d57550cc96cc">Internal MS</AcquiredFrom>
-    <FriendlyTitle xmlns="4873beb7-5857-4685-be1f-d57550cc96cc" xsi:nil="true"/>
-    <LastHandOff xmlns="4873beb7-5857-4685-be1f-d57550cc96cc" xsi:nil="true"/>
-    <TPClientViewer xmlns="4873beb7-5857-4685-be1f-d57550cc96cc" xsi:nil="true"/>
-    <TemplateStatus xmlns="4873beb7-5857-4685-be1f-d57550cc96cc">Complete</TemplateStatus>
-    <Downloads xmlns="4873beb7-5857-4685-be1f-d57550cc96cc">0</Downloads>
-    <OOCacheId xmlns="4873beb7-5857-4685-be1f-d57550cc96cc" xsi:nil="true"/>
-    <IsDeleted xmlns="4873beb7-5857-4685-be1f-d57550cc96cc">false</IsDeleted>
-    <LocPublishedDependentAssetsLookup xmlns="4873beb7-5857-4685-be1f-d57550cc96cc" xsi:nil="true"/>
-    <TPExecutable xmlns="4873beb7-5857-4685-be1f-d57550cc96cc" xsi:nil="true"/>
-    <EditorialTags xmlns="4873beb7-5857-4685-be1f-d57550cc96cc" xsi:nil="true"/>
-    <SubmitterId xmlns="4873beb7-5857-4685-be1f-d57550cc96cc" xsi:nil="true"/>
-    <ApprovalLog xmlns="4873beb7-5857-4685-be1f-d57550cc96cc" xsi:nil="true"/>
-    <AssetType xmlns="4873beb7-5857-4685-be1f-d57550cc96cc">TP</AssetType>
-    <BugNumber xmlns="4873beb7-5857-4685-be1f-d57550cc96cc" xsi:nil="true"/>
-    <CSXSubmissionDate xmlns="4873beb7-5857-4685-be1f-d57550cc96cc" xsi:nil="true"/>
-    <CSXUpdate xmlns="4873beb7-5857-4685-be1f-d57550cc96cc">false</CSXUpdate>
-    <Milestone xmlns="4873beb7-5857-4685-be1f-d57550cc96cc" xsi:nil="true"/>
-    <RecommendationsModifier xmlns="4873beb7-5857-4685-be1f-d57550cc96cc" xsi:nil="true"/>
-    <OriginAsset xmlns="4873beb7-5857-4685-be1f-d57550cc96cc" xsi:nil="true"/>
-    <TPComponent xmlns="4873beb7-5857-4685-be1f-d57550cc96cc" xsi:nil="true"/>
-    <AssetId xmlns="4873beb7-5857-4685-be1f-d57550cc96cc">TP102787989</AssetId>
-    <IntlLocPriority xmlns="4873beb7-5857-4685-be1f-d57550cc96cc" xsi:nil="true"/>
-    <PolicheckWords xmlns="4873beb7-5857-4685-be1f-d57550cc96cc" xsi:nil="true"/>
-    <TPLaunchHelpLink xmlns="4873beb7-5857-4685-be1f-d57550cc96cc" xsi:nil="true"/>
-    <TPApplication xmlns="4873beb7-5857-4685-be1f-d57550cc96cc" xsi:nil="true"/>
-    <CrawlForDependencies xmlns="4873beb7-5857-4685-be1f-d57550cc96cc">false</CrawlForDependencies>
-    <HandoffToMSDN xmlns="4873beb7-5857-4685-be1f-d57550cc96cc" xsi:nil="true"/>
-    <PlannedPubDate xmlns="4873beb7-5857-4685-be1f-d57550cc96cc" xsi:nil="true"/>
-    <IntlLangReviewer xmlns="4873beb7-5857-4685-be1f-d57550cc96cc" xsi:nil="true"/>
-    <TrustLevel xmlns="4873beb7-5857-4685-be1f-d57550cc96cc">1 Microsoft Managed Content</TrustLevel>
-    <LocLastLocAttemptVersionLookup xmlns="4873beb7-5857-4685-be1f-d57550cc96cc">694266</LocLastLocAttemptVersionLookup>
-    <LocProcessedForHandoffsLookup xmlns="4873beb7-5857-4685-be1f-d57550cc96cc" xsi:nil="true"/>
-    <IsSearchable xmlns="4873beb7-5857-4685-be1f-d57550cc96cc">true</IsSearchable>
-    <TemplateTemplateType xmlns="4873beb7-5857-4685-be1f-d57550cc96cc">PowerPoint Presentation Template</TemplateTemplateType>
-    <CampaignTagsTaxHTField0 xmlns="4873beb7-5857-4685-be1f-d57550cc96cc">
-      <Terms xmlns="http://schemas.microsoft.com/office/infopath/2007/PartnerControls"/>
-    </CampaignTagsTaxHTField0>
-    <TPNamespace xmlns="4873beb7-5857-4685-be1f-d57550cc96cc" xsi:nil="true"/>
-    <LocOverallPreviewStatusLookup xmlns="4873beb7-5857-4685-be1f-d57550cc96cc" xsi:nil="true"/>
-    <TaxCatchAll xmlns="4873beb7-5857-4685-be1f-d57550cc96cc"/>
-    <Markets xmlns="4873beb7-5857-4685-be1f-d57550cc96cc"/>
-    <UAProjectedTotalWords xmlns="4873beb7-5857-4685-be1f-d57550cc96cc" xsi:nil="true"/>
-    <IntlLangReview xmlns="4873beb7-5857-4685-be1f-d57550cc96cc" xsi:nil="true"/>
-    <OutputCachingOn xmlns="4873beb7-5857-4685-be1f-d57550cc96cc">false</OutputCachingOn>
-    <AverageRating xmlns="4873beb7-5857-4685-be1f-d57550cc96cc" xsi:nil="true"/>
-    <APAuthor xmlns="4873beb7-5857-4685-be1f-d57550cc96cc">
-      <UserInfo>
-        <DisplayName>REDMOND\kristaa</DisplayName>
-        <AccountId>136</AccountId>
-        <AccountType/>
-      </UserInfo>
-    </APAuthor>
-    <LocManualTestRequired xmlns="4873beb7-5857-4685-be1f-d57550cc96cc">false</LocManualTestRequired>
-    <TPCommandLine xmlns="4873beb7-5857-4685-be1f-d57550cc96cc" xsi:nil="true"/>
-    <TPAppVersion xmlns="4873beb7-5857-4685-be1f-d57550cc96cc" xsi:nil="true"/>
-    <EditorialStatus xmlns="4873beb7-5857-4685-be1f-d57550cc96cc">Complete</EditorialStatus>
-    <LastModifiedDateTime xmlns="4873beb7-5857-4685-be1f-d57550cc96cc" xsi:nil="true"/>
-    <ScenarioTagsTaxHTField0 xmlns="4873beb7-5857-4685-be1f-d57550cc96cc">
-      <Terms xmlns="http://schemas.microsoft.com/office/infopath/2007/PartnerControls"/>
-    </ScenarioTagsTaxHTField0>
-    <LocProcessedForMarketsLookup xmlns="4873beb7-5857-4685-be1f-d57550cc96cc" xsi:nil="true"/>
-    <TPLaunchHelpLinkType xmlns="4873beb7-5857-4685-be1f-d57550cc96cc">Template</TPLaunchHelpLinkType>
-    <OriginalRelease xmlns="4873beb7-5857-4685-be1f-d57550cc96cc">15</OriginalRelease>
-    <LocalizationTagsTaxHTField0 xmlns="4873beb7-5857-4685-be1f-d57550cc96cc">
-      <Terms xmlns="http://schemas.microsoft.com/office/infopath/2007/PartnerControls"/>
-    </LocalizationTagsTaxHTField0>
-    <UACurrentWords xmlns="4873beb7-5857-4685-be1f-d57550cc96cc" xsi:nil="true"/>
-    <ArtSampleDocs xmlns="4873beb7-5857-4685-be1f-d57550cc96cc" xsi:nil="true"/>
-    <UALocRecommendation xmlns="4873beb7-5857-4685-be1f-d57550cc96cc">Localize</UALocRecommendation>
-    <Manager xmlns="4873beb7-5857-4685-be1f-d57550cc96cc" xsi:nil="true"/>
-    <LocOverallHandbackStatusLookup xmlns="4873beb7-5857-4685-be1f-d57550cc96cc" xsi:nil="true"/>
-    <ShowIn xmlns="4873beb7-5857-4685-be1f-d57550cc96cc">Show everywhere</ShowIn>
-    <UANotes xmlns="4873beb7-5857-4685-be1f-d57550cc96cc" xsi:nil="true"/>
-    <InternalTagsTaxHTField0 xmlns="4873beb7-5857-4685-be1f-d57550cc96cc">
-      <Terms xmlns="http://schemas.microsoft.com/office/infopath/2007/PartnerControls"/>
-    </InternalTagsTaxHTField0>
-    <CSXHash xmlns="4873beb7-5857-4685-be1f-d57550cc96cc" xsi:nil="true"/>
-    <VoteCount xmlns="4873beb7-5857-4685-be1f-d57550cc96cc" xsi:nil="true"/>
-    <AssetExpire xmlns="4873beb7-5857-4685-be1f-d57550cc96cc">2029-05-12T07:00:00+00:00</AssetExpire>
-    <DSATActionTaken xmlns="4873beb7-5857-4685-be1f-d57550cc96cc" xsi:nil="true"/>
-    <CSXSubmissionMarket xmlns="4873beb7-5857-4685-be1f-d57550cc96cc" xsi:nil="true"/>
-    <LocMarketGroupTiers2 xmlns="4873beb7-5857-4685-be1f-d57550cc96cc" xsi:nil="true"/>
-  </documentManagement>
-</p:properties>
+<?mso-contentType ?>
+<FormTemplates xmlns="http://schemas.microsoft.com/sharepoint/v3/contenttype/forms">
+  <Display>DocumentLibraryForm</Display>
+  <Edit>AssetEditForm</Edit>
+  <New>DocumentLibraryForm</New>
+</FormTemplates>
 </file>
 
 <file path=customXml/itemProps1.xml><?xml version="1.0" encoding="utf-8"?>
-<ds:datastoreItem xmlns:ds="http://schemas.openxmlformats.org/officeDocument/2006/customXml" ds:itemID="{3836F65B-1B07-41EE-A0E8-BC6EF3855225}">
+<ds:datastoreItem xmlns:ds="http://schemas.openxmlformats.org/officeDocument/2006/customXml" ds:itemID="{60C67BEE-D13F-4BD2-98A5-34D8A0977F68}">
   <ds:schemaRefs>
-    <ds:schemaRef ds:uri="http://schemas.microsoft.com/sharepoint/v3/contenttype/forms"/>
+    <ds:schemaRef ds:uri="4873beb7-5857-4685-be1f-d57550cc96cc"/>
+    <ds:schemaRef ds:uri="http://schemas.openxmlformats.org/package/2006/metadata/core-properties"/>
+    <ds:schemaRef ds:uri="http://purl.org/dc/terms/"/>
+    <ds:schemaRef ds:uri="http://schemas.microsoft.com/office/2006/documentManagement/types"/>
+    <ds:schemaRef ds:uri="http://purl.org/dc/elements/1.1/"/>
+    <ds:schemaRef ds:uri="http://schemas.microsoft.com/office/2006/metadata/properties"/>
+    <ds:schemaRef ds:uri="http://schemas.microsoft.com/office/infopath/2007/PartnerControls"/>
+    <ds:schemaRef ds:uri="http://www.w3.org/XML/1998/namespace"/>
+    <ds:schemaRef ds:uri="http://purl.org/dc/dcmitype/"/>
   </ds:schemaRefs>
 </ds:datastoreItem>
 </file>
@@ -8159,17 +8513,9 @@
 </file>
 
 <file path=customXml/itemProps3.xml><?xml version="1.0" encoding="utf-8"?>
-<ds:datastoreItem xmlns:ds="http://schemas.openxmlformats.org/officeDocument/2006/customXml" ds:itemID="{60C67BEE-D13F-4BD2-98A5-34D8A0977F68}">
+<ds:datastoreItem xmlns:ds="http://schemas.openxmlformats.org/officeDocument/2006/customXml" ds:itemID="{3836F65B-1B07-41EE-A0E8-BC6EF3855225}">
   <ds:schemaRefs>
-    <ds:schemaRef ds:uri="4873beb7-5857-4685-be1f-d57550cc96cc"/>
-    <ds:schemaRef ds:uri="http://schemas.openxmlformats.org/package/2006/metadata/core-properties"/>
-    <ds:schemaRef ds:uri="http://purl.org/dc/terms/"/>
-    <ds:schemaRef ds:uri="http://schemas.microsoft.com/office/2006/documentManagement/types"/>
-    <ds:schemaRef ds:uri="http://purl.org/dc/elements/1.1/"/>
-    <ds:schemaRef ds:uri="http://schemas.microsoft.com/office/2006/metadata/properties"/>
-    <ds:schemaRef ds:uri="http://schemas.microsoft.com/office/infopath/2007/PartnerControls"/>
-    <ds:schemaRef ds:uri="http://www.w3.org/XML/1998/namespace"/>
-    <ds:schemaRef ds:uri="http://purl.org/dc/dcmitype/"/>
+    <ds:schemaRef ds:uri="http://schemas.microsoft.com/sharepoint/v3/contenttype/forms"/>
   </ds:schemaRefs>
 </ds:datastoreItem>
 </file>
</xml_diff>

<commit_message>
added data to csv, rounded labels, added dev/set/train partition, experiments with logical regression
</commit_message>
<xml_diff>
--- a/P2/CheckPoint 1.pptx
+++ b/P2/CheckPoint 1.pptx
@@ -5710,7 +5710,7 @@
               <a:buNone/>
             </a:pPr>
             <a:r>
-              <a:rPr lang="en-US" sz="1800" dirty="0"/>
+              <a:rPr lang="en-US" sz="2000" dirty="0"/>
               <a:t>Natural Language Processing (NLP Problems): Detecting Offense</a:t>
             </a:r>
           </a:p>
@@ -5722,10 +5722,10 @@
               <a:buNone/>
             </a:pPr>
             <a:r>
-              <a:rPr lang="en-GB" sz="1800" dirty="0"/>
+              <a:rPr lang="en-GB" sz="2000" dirty="0"/>
               <a:t>In an NLP Problem, the textual data should be processed and transformed into appropriate datasets. Then, an initial exploratory data analysis should be carried out, along with different pre-processing and feature engineering techniques. The employed machine learning algorithms should be tested and compared (performance during learning, confusion matrix, precision, recall, accuracy, F1 measure) and the time spent to train/test the models.</a:t>
             </a:r>
-            <a:endParaRPr lang="en-GB" sz="1800" b="0" i="0" dirty="0">
+            <a:endParaRPr lang="en-GB" sz="2000" b="0" i="0" dirty="0">
               <a:effectLst/>
             </a:endParaRPr>
           </a:p>
@@ -5737,21 +5737,21 @@
               <a:buNone/>
             </a:pPr>
             <a:r>
-              <a:rPr lang="en-US" sz="1800" dirty="0"/>
+              <a:rPr lang="en-US" sz="2000" dirty="0"/>
               <a:t>This project aims to identify </a:t>
             </a:r>
             <a:r>
-              <a:rPr lang="en-US" sz="1800" b="0" i="0" dirty="0">
+              <a:rPr lang="en-US" sz="2000" b="0" i="0" dirty="0">
                 <a:effectLst/>
               </a:rPr>
               <a:t>how offensive a given text </a:t>
             </a:r>
             <a:r>
-              <a:rPr lang="en-US" sz="1800" dirty="0"/>
+              <a:rPr lang="en-US" sz="2000" dirty="0"/>
               <a:t>is, by attributing a </a:t>
             </a:r>
             <a:r>
-              <a:rPr lang="en-US" sz="1800" b="0" i="0" dirty="0">
+              <a:rPr lang="en-US" sz="2000" b="0" i="0" dirty="0">
                 <a:effectLst/>
               </a:rPr>
               <a:t>score from 0 – 5 (5 being the most offensive).</a:t>
@@ -5765,21 +5765,21 @@
               <a:buNone/>
             </a:pPr>
             <a:r>
-              <a:rPr lang="en-US" sz="1800" dirty="0"/>
-              <a:t>The test file contains</a:t>
-            </a:r>
-            <a:r>
-              <a:rPr lang="en-US" sz="1800" b="0" i="0" dirty="0">
+              <a:rPr lang="en-US" sz="2000" dirty="0"/>
+              <a:t>The test file contains 9000</a:t>
+            </a:r>
+            <a:r>
+              <a:rPr lang="en-US" sz="2000" b="0" i="0" dirty="0">
                 <a:effectLst/>
               </a:rPr>
               <a:t> labels and ratings from a balanced set of age groups from 18-70. </a:t>
             </a:r>
             <a:r>
-              <a:rPr lang="en-US" sz="1800" dirty="0"/>
+              <a:rPr lang="en-US" sz="2000" dirty="0"/>
               <a:t>The</a:t>
             </a:r>
             <a:r>
-              <a:rPr lang="en-US" sz="1800" b="0" i="0" dirty="0">
+              <a:rPr lang="en-US" sz="2000" b="0" i="0" dirty="0">
                 <a:effectLst/>
               </a:rPr>
               <a:t> annotators also represented a variety of genders, political stances and income levels. </a:t>
@@ -5880,20 +5880,20 @@
           <a:lstStyle/>
           <a:p>
             <a:r>
-              <a:rPr lang="en-GB" sz="1800" b="0" i="0" u="none" strike="noStrike" dirty="0">
+              <a:rPr lang="en-GB" sz="2000" b="0" i="0" u="none" strike="noStrike" dirty="0">
                 <a:effectLst/>
               </a:rPr>
               <a:t>Splitting into train, dev and test sets: </a:t>
             </a:r>
             <a:r>
-              <a:rPr lang="en-GB" sz="1800" b="0" i="0" u="none" strike="noStrike" dirty="0">
+              <a:rPr lang="en-GB" sz="2000" b="0" i="0" u="none" strike="noStrike" dirty="0">
                 <a:effectLst/>
                 <a:hlinkClick r:id="rId2" tooltip="https://cs230.stanford.edu/blog/split/"/>
               </a:rPr>
               <a:t>https://cs230.stanford.edu/blog/split/</a:t>
             </a:r>
             <a:r>
-              <a:rPr lang="en-GB" sz="1800" b="0" i="0" u="none" strike="noStrike" dirty="0">
+              <a:rPr lang="en-GB" sz="2000" b="0" i="0" u="none" strike="noStrike" dirty="0">
                 <a:effectLst/>
               </a:rPr>
               <a:t> </a:t>
@@ -5901,61 +5901,61 @@
           </a:p>
           <a:p>
             <a:r>
-              <a:rPr lang="en-US" sz="1800" dirty="0"/>
+              <a:rPr lang="en-US" sz="2000" dirty="0"/>
               <a:t>N-Grams: </a:t>
             </a:r>
             <a:r>
-              <a:rPr lang="en-GB" sz="1800" b="0" i="0" u="none" strike="noStrike" dirty="0">
+              <a:rPr lang="en-GB" sz="2000" b="0" i="0" u="none" strike="noStrike" dirty="0">
                 <a:effectLst/>
                 <a:hlinkClick r:id="rId3" tooltip="https://www.lexalytics.com/lexablog/context-analysis-nlp"/>
               </a:rPr>
               <a:t>https://www.lexalytics.com/lexablog/context-analysis-nlp</a:t>
             </a:r>
-            <a:endParaRPr lang="en-GB" sz="1800" b="0" i="0" u="none" strike="noStrike" dirty="0">
+            <a:endParaRPr lang="en-GB" sz="2000" b="0" i="0" u="none" strike="noStrike" dirty="0">
               <a:effectLst/>
             </a:endParaRPr>
           </a:p>
           <a:p>
             <a:r>
-              <a:rPr lang="en-US" sz="1800" dirty="0"/>
+              <a:rPr lang="en-US" sz="2000" dirty="0"/>
               <a:t>Synonyms/Antonyms and POS: </a:t>
             </a:r>
             <a:r>
-              <a:rPr lang="en-GB" sz="1800" b="0" i="0" u="sng" dirty="0">
+              <a:rPr lang="en-GB" sz="2000" b="0" i="0" u="sng" dirty="0">
                 <a:effectLst/>
                 <a:hlinkClick r:id="rId4" tooltip="https://www.journaldev.com/46194/natural-language-processing-tasks"/>
               </a:rPr>
               <a:t>https://www.journaldev.com/46194/natural-language-processing-tasks</a:t>
             </a:r>
-            <a:endParaRPr lang="en-GB" sz="1800" b="0" i="0" u="sng" dirty="0">
+            <a:endParaRPr lang="en-GB" sz="2000" b="0" i="0" u="sng" dirty="0">
               <a:effectLst/>
             </a:endParaRPr>
           </a:p>
           <a:p>
             <a:r>
-              <a:rPr lang="en-US" sz="1800" dirty="0"/>
+              <a:rPr lang="en-US" sz="2000" dirty="0"/>
               <a:t>“</a:t>
             </a:r>
             <a:r>
-              <a:rPr lang="en-GB" sz="1800" dirty="0"/>
+              <a:rPr lang="en-GB" sz="2000" dirty="0"/>
               <a:t>Method for Detecting and Rating </a:t>
             </a:r>
             <a:r>
-              <a:rPr lang="en-GB" sz="1800" dirty="0" err="1"/>
+              <a:rPr lang="en-GB" sz="2000" dirty="0" err="1"/>
               <a:t>Humor</a:t>
             </a:r>
             <a:r>
-              <a:rPr lang="en-GB" sz="1800" dirty="0"/>
+              <a:rPr lang="en-GB" sz="2000" dirty="0"/>
               <a:t> Based on Multi-Task Adversarial Training”: </a:t>
             </a:r>
             <a:r>
-              <a:rPr lang="en-GB" sz="1800" b="0" i="0" u="none" strike="noStrike" dirty="0">
+              <a:rPr lang="en-GB" sz="2000" b="0" i="0" u="none" strike="noStrike" dirty="0">
                 <a:effectLst/>
                 <a:hlinkClick r:id="rId5" tooltip="https://arxiv.org/pdf/2104.10336v1.pdf"/>
               </a:rPr>
               <a:t>https://arxiv.org/pdf/2104.10336v1.pdf</a:t>
             </a:r>
-            <a:endParaRPr lang="en-GB" sz="1800" dirty="0"/>
+            <a:endParaRPr lang="en-GB" sz="2000" dirty="0"/>
           </a:p>
         </p:txBody>
       </p:sp>
@@ -6059,8 +6059,8 @@
         </p:nvSpPr>
         <p:spPr>
           <a:xfrm>
-            <a:off x="1192344" y="1916832"/>
-            <a:ext cx="10060105" cy="4247317"/>
+            <a:off x="1197869" y="1700808"/>
+            <a:ext cx="10060105" cy="4708981"/>
           </a:xfrm>
           <a:prstGeom prst="rect">
             <a:avLst/>
@@ -6074,7 +6074,7 @@
           <a:lstStyle/>
           <a:p>
             <a:r>
-              <a:rPr lang="en-GB" sz="1800" dirty="0"/>
+              <a:rPr lang="en-GB" sz="2000" dirty="0"/>
               <a:t>Machine learning algorithms:</a:t>
             </a:r>
           </a:p>
@@ -6084,7 +6084,7 @@
               <a:buChar char="•"/>
             </a:pPr>
             <a:r>
-              <a:rPr lang="en-GB" sz="1800" dirty="0"/>
+              <a:rPr lang="en-GB" sz="2000" dirty="0"/>
               <a:t>SVM</a:t>
             </a:r>
           </a:p>
@@ -6094,7 +6094,7 @@
               <a:buChar char="•"/>
             </a:pPr>
             <a:r>
-              <a:rPr lang="en-GB" sz="1800" dirty="0"/>
+              <a:rPr lang="en-GB" sz="2000" dirty="0"/>
               <a:t>Neural Networks</a:t>
             </a:r>
           </a:p>
@@ -6104,16 +6104,16 @@
               <a:buChar char="•"/>
             </a:pPr>
             <a:r>
-              <a:rPr lang="en-GB" sz="1800" dirty="0"/>
+              <a:rPr lang="en-GB" sz="2000" dirty="0"/>
               <a:t>Logistic Regression</a:t>
             </a:r>
           </a:p>
           <a:p>
-            <a:endParaRPr lang="en-GB" sz="1800" dirty="0"/>
-          </a:p>
-          <a:p>
-            <a:r>
-              <a:rPr lang="en-GB" sz="1800" dirty="0"/>
+            <a:endParaRPr lang="en-GB" sz="2000" dirty="0"/>
+          </a:p>
+          <a:p>
+            <a:r>
+              <a:rPr lang="en-GB" sz="2000" dirty="0"/>
               <a:t>Pre-processing of data:</a:t>
             </a:r>
           </a:p>
@@ -6123,7 +6123,7 @@
               <a:buChar char="•"/>
             </a:pPr>
             <a:r>
-              <a:rPr lang="en-GB" sz="1800" dirty="0"/>
+              <a:rPr lang="en-GB" sz="2000" dirty="0"/>
               <a:t>Porter Stemmer</a:t>
             </a:r>
           </a:p>
@@ -6133,7 +6133,7 @@
               <a:buChar char="•"/>
             </a:pPr>
             <a:r>
-              <a:rPr lang="en-GB" sz="1800" dirty="0"/>
+              <a:rPr lang="en-GB" sz="2000" dirty="0"/>
               <a:t>Bag of words</a:t>
             </a:r>
           </a:p>
@@ -6143,7 +6143,7 @@
               <a:buChar char="•"/>
             </a:pPr>
             <a:r>
-              <a:rPr lang="en-GB" sz="1800" dirty="0"/>
+              <a:rPr lang="en-GB" sz="2000" dirty="0"/>
               <a:t>Part of Speech (POS)</a:t>
             </a:r>
           </a:p>
@@ -6153,7 +6153,7 @@
               <a:buChar char="•"/>
             </a:pPr>
             <a:r>
-              <a:rPr lang="en-GB" sz="1800" dirty="0"/>
+              <a:rPr lang="en-GB" sz="2000" dirty="0"/>
               <a:t>Handling negation</a:t>
             </a:r>
           </a:p>
@@ -6163,7 +6163,7 @@
               <a:buChar char="•"/>
             </a:pPr>
             <a:r>
-              <a:rPr lang="en-GB" sz="1800" dirty="0"/>
+              <a:rPr lang="en-GB" sz="2000" dirty="0"/>
               <a:t>Synonyms/Antonyms</a:t>
             </a:r>
           </a:p>
@@ -6173,7 +6173,7 @@
               <a:buChar char="•"/>
             </a:pPr>
             <a:r>
-              <a:rPr lang="en-GB" sz="1800" dirty="0"/>
+              <a:rPr lang="en-GB" sz="2000" dirty="0"/>
               <a:t>N-grams</a:t>
             </a:r>
           </a:p>
@@ -6183,7 +6183,7 @@
               <a:buChar char="•"/>
             </a:pPr>
             <a:r>
-              <a:rPr lang="en-GB" sz="1800" dirty="0"/>
+              <a:rPr lang="en-GB" sz="2000" dirty="0"/>
               <a:t>Slang data sheet</a:t>
             </a:r>
           </a:p>
@@ -6192,11 +6192,11 @@
               <a:buFont typeface="Arial" panose="020B0604020202020204" pitchFamily="34" charset="0"/>
               <a:buChar char="•"/>
             </a:pPr>
-            <a:endParaRPr lang="en-GB" sz="1800" dirty="0"/>
-          </a:p>
-          <a:p>
-            <a:r>
-              <a:rPr lang="en-GB" sz="1800" dirty="0"/>
+            <a:endParaRPr lang="en-GB" sz="2000" dirty="0"/>
+          </a:p>
+          <a:p>
+            <a:r>
+              <a:rPr lang="en-GB" sz="2000" dirty="0"/>
               <a:t>Import of ‘transformers’ library to use the BERT Pre-Trained Language Model?</a:t>
             </a:r>
           </a:p>
@@ -6292,7 +6292,7 @@
         <p:spPr>
           <a:xfrm>
             <a:off x="1197868" y="1916832"/>
-            <a:ext cx="10060105" cy="923330"/>
+            <a:ext cx="10060105" cy="2308324"/>
           </a:xfrm>
           <a:prstGeom prst="rect">
             <a:avLst/>
@@ -6306,15 +6306,56 @@
           <a:lstStyle/>
           <a:p>
             <a:r>
-              <a:rPr lang="en-GB" sz="1800" dirty="0"/>
-              <a:t>Language of choice is Python.</a:t>
-            </a:r>
-          </a:p>
-          <a:p>
-            <a:endParaRPr lang="en-GB" sz="1800" dirty="0"/>
-          </a:p>
-          <a:p>
-            <a:endParaRPr lang="en-GB" sz="1800" dirty="0"/>
+              <a:rPr lang="en-GB" sz="2000" dirty="0"/>
+              <a:t>Language of choice is Python (</a:t>
+            </a:r>
+            <a:r>
+              <a:rPr lang="en-GB" sz="2000" dirty="0" err="1"/>
+              <a:t>Jupyter</a:t>
+            </a:r>
+            <a:r>
+              <a:rPr lang="en-GB" sz="2000" dirty="0"/>
+              <a:t> Notebook).</a:t>
+            </a:r>
+          </a:p>
+          <a:p>
+            <a:endParaRPr lang="en-GB" sz="2000" dirty="0"/>
+          </a:p>
+          <a:p>
+            <a:pPr marL="285750" indent="-285750">
+              <a:buFont typeface="Arial" panose="020B0604020202020204" pitchFamily="34" charset="0"/>
+              <a:buChar char="•"/>
+            </a:pPr>
+            <a:r>
+              <a:rPr lang="en-GB" sz="2000" dirty="0"/>
+              <a:t>Label data tidying (round floats to integers)</a:t>
+            </a:r>
+          </a:p>
+          <a:p>
+            <a:pPr marL="285750" indent="-285750">
+              <a:buFont typeface="Arial" panose="020B0604020202020204" pitchFamily="34" charset="0"/>
+              <a:buChar char="•"/>
+            </a:pPr>
+            <a:r>
+              <a:rPr lang="en-GB" sz="2000" dirty="0"/>
+              <a:t>Partition of data into dev, train and test sets</a:t>
+            </a:r>
+          </a:p>
+          <a:p>
+            <a:pPr marL="285750" indent="-285750">
+              <a:buFont typeface="Arial" panose="020B0604020202020204" pitchFamily="34" charset="0"/>
+              <a:buChar char="•"/>
+            </a:pPr>
+            <a:r>
+              <a:rPr lang="en-GB" sz="2000" dirty="0"/>
+              <a:t>Experiments with SVM and Logistical Regression</a:t>
+            </a:r>
+          </a:p>
+          <a:p>
+            <a:endParaRPr lang="en-GB" sz="2000" dirty="0"/>
+          </a:p>
+          <a:p>
+            <a:endParaRPr lang="en-GB" sz="2000" dirty="0"/>
           </a:p>
         </p:txBody>
       </p:sp>
@@ -7294,139 +7335,12 @@
 </file>
 
 <file path=customXml/item1.xml><?xml version="1.0" encoding="utf-8"?>
-<p:properties xmlns:p="http://schemas.microsoft.com/office/2006/metadata/properties" xmlns:xsi="http://www.w3.org/2001/XMLSchema-instance" xmlns:pc="http://schemas.microsoft.com/office/infopath/2007/PartnerControls">
-  <documentManagement>
-    <LocPublishedLinkedAssetsLookup xmlns="4873beb7-5857-4685-be1f-d57550cc96cc" xsi:nil="true"/>
-    <ApprovalStatus xmlns="4873beb7-5857-4685-be1f-d57550cc96cc">InProgress</ApprovalStatus>
-    <MarketSpecific xmlns="4873beb7-5857-4685-be1f-d57550cc96cc">false</MarketSpecific>
-    <LocComments xmlns="4873beb7-5857-4685-be1f-d57550cc96cc" xsi:nil="true"/>
-    <LocLastLocAttemptVersionTypeLookup xmlns="4873beb7-5857-4685-be1f-d57550cc96cc" xsi:nil="true"/>
-    <DirectSourceMarket xmlns="4873beb7-5857-4685-be1f-d57550cc96cc" xsi:nil="true"/>
-    <ThumbnailAssetId xmlns="4873beb7-5857-4685-be1f-d57550cc96cc" xsi:nil="true"/>
-    <PrimaryImageGen xmlns="4873beb7-5857-4685-be1f-d57550cc96cc">false</PrimaryImageGen>
-    <LocNewPublishedVersionLookup xmlns="4873beb7-5857-4685-be1f-d57550cc96cc" xsi:nil="true"/>
-    <LegacyData xmlns="4873beb7-5857-4685-be1f-d57550cc96cc" xsi:nil="true"/>
-    <LocRecommendedHandoff xmlns="4873beb7-5857-4685-be1f-d57550cc96cc" xsi:nil="true"/>
-    <BusinessGroup xmlns="4873beb7-5857-4685-be1f-d57550cc96cc" xsi:nil="true"/>
-    <BlockPublish xmlns="4873beb7-5857-4685-be1f-d57550cc96cc">false</BlockPublish>
-    <TPFriendlyName xmlns="4873beb7-5857-4685-be1f-d57550cc96cc" xsi:nil="true"/>
-    <LocOverallPublishStatusLookup xmlns="4873beb7-5857-4685-be1f-d57550cc96cc" xsi:nil="true"/>
-    <NumericId xmlns="4873beb7-5857-4685-be1f-d57550cc96cc" xsi:nil="true"/>
-    <APEditor xmlns="4873beb7-5857-4685-be1f-d57550cc96cc">
-      <UserInfo>
-        <DisplayName/>
-        <AccountId xsi:nil="true"/>
-        <AccountType/>
-      </UserInfo>
-    </APEditor>
-    <SourceTitle xmlns="4873beb7-5857-4685-be1f-d57550cc96cc" xsi:nil="true"/>
-    <OpenTemplate xmlns="4873beb7-5857-4685-be1f-d57550cc96cc">true</OpenTemplate>
-    <LocOverallLocStatusLookup xmlns="4873beb7-5857-4685-be1f-d57550cc96cc" xsi:nil="true"/>
-    <UALocComments xmlns="4873beb7-5857-4685-be1f-d57550cc96cc" xsi:nil="true"/>
-    <ParentAssetId xmlns="4873beb7-5857-4685-be1f-d57550cc96cc" xsi:nil="true"/>
-    <IntlLangReviewDate xmlns="4873beb7-5857-4685-be1f-d57550cc96cc" xsi:nil="true"/>
-    <FeatureTagsTaxHTField0 xmlns="4873beb7-5857-4685-be1f-d57550cc96cc">
-      <Terms xmlns="http://schemas.microsoft.com/office/infopath/2007/PartnerControls"/>
-    </FeatureTagsTaxHTField0>
-    <PublishStatusLookup xmlns="4873beb7-5857-4685-be1f-d57550cc96cc">
-      <Value>1345093</Value>
-    </PublishStatusLookup>
-    <Providers xmlns="4873beb7-5857-4685-be1f-d57550cc96cc" xsi:nil="true"/>
-    <MachineTranslated xmlns="4873beb7-5857-4685-be1f-d57550cc96cc">false</MachineTranslated>
-    <OriginalSourceMarket xmlns="4873beb7-5857-4685-be1f-d57550cc96cc" xsi:nil="true"/>
-    <APDescription xmlns="4873beb7-5857-4685-be1f-d57550cc96cc">This simple template design works for technology and  businesses, but it's versatile enough to use in other contexts.  It features multiple slide layouts designed for widescreen (16x9 resolution) and includes a sample SmartArt list and chart that are easily editable.</APDescription>
-    <ClipArtFilename xmlns="4873beb7-5857-4685-be1f-d57550cc96cc" xsi:nil="true"/>
-    <ContentItem xmlns="4873beb7-5857-4685-be1f-d57550cc96cc" xsi:nil="true"/>
-    <TPInstallLocation xmlns="4873beb7-5857-4685-be1f-d57550cc96cc" xsi:nil="true"/>
-    <PublishTargets xmlns="4873beb7-5857-4685-be1f-d57550cc96cc">OfficeOnlineVNext</PublishTargets>
-    <TimesCloned xmlns="4873beb7-5857-4685-be1f-d57550cc96cc" xsi:nil="true"/>
-    <AssetStart xmlns="4873beb7-5857-4685-be1f-d57550cc96cc">2011-11-26T00:30:00+00:00</AssetStart>
-    <Provider xmlns="4873beb7-5857-4685-be1f-d57550cc96cc" xsi:nil="true"/>
-    <AcquiredFrom xmlns="4873beb7-5857-4685-be1f-d57550cc96cc">Internal MS</AcquiredFrom>
-    <FriendlyTitle xmlns="4873beb7-5857-4685-be1f-d57550cc96cc" xsi:nil="true"/>
-    <LastHandOff xmlns="4873beb7-5857-4685-be1f-d57550cc96cc" xsi:nil="true"/>
-    <TPClientViewer xmlns="4873beb7-5857-4685-be1f-d57550cc96cc" xsi:nil="true"/>
-    <TemplateStatus xmlns="4873beb7-5857-4685-be1f-d57550cc96cc">Complete</TemplateStatus>
-    <Downloads xmlns="4873beb7-5857-4685-be1f-d57550cc96cc">0</Downloads>
-    <OOCacheId xmlns="4873beb7-5857-4685-be1f-d57550cc96cc" xsi:nil="true"/>
-    <IsDeleted xmlns="4873beb7-5857-4685-be1f-d57550cc96cc">false</IsDeleted>
-    <LocPublishedDependentAssetsLookup xmlns="4873beb7-5857-4685-be1f-d57550cc96cc" xsi:nil="true"/>
-    <TPExecutable xmlns="4873beb7-5857-4685-be1f-d57550cc96cc" xsi:nil="true"/>
-    <EditorialTags xmlns="4873beb7-5857-4685-be1f-d57550cc96cc" xsi:nil="true"/>
-    <SubmitterId xmlns="4873beb7-5857-4685-be1f-d57550cc96cc" xsi:nil="true"/>
-    <ApprovalLog xmlns="4873beb7-5857-4685-be1f-d57550cc96cc" xsi:nil="true"/>
-    <AssetType xmlns="4873beb7-5857-4685-be1f-d57550cc96cc">TP</AssetType>
-    <BugNumber xmlns="4873beb7-5857-4685-be1f-d57550cc96cc" xsi:nil="true"/>
-    <CSXSubmissionDate xmlns="4873beb7-5857-4685-be1f-d57550cc96cc" xsi:nil="true"/>
-    <CSXUpdate xmlns="4873beb7-5857-4685-be1f-d57550cc96cc">false</CSXUpdate>
-    <Milestone xmlns="4873beb7-5857-4685-be1f-d57550cc96cc" xsi:nil="true"/>
-    <RecommendationsModifier xmlns="4873beb7-5857-4685-be1f-d57550cc96cc" xsi:nil="true"/>
-    <OriginAsset xmlns="4873beb7-5857-4685-be1f-d57550cc96cc" xsi:nil="true"/>
-    <TPComponent xmlns="4873beb7-5857-4685-be1f-d57550cc96cc" xsi:nil="true"/>
-    <AssetId xmlns="4873beb7-5857-4685-be1f-d57550cc96cc">TP102787989</AssetId>
-    <IntlLocPriority xmlns="4873beb7-5857-4685-be1f-d57550cc96cc" xsi:nil="true"/>
-    <PolicheckWords xmlns="4873beb7-5857-4685-be1f-d57550cc96cc" xsi:nil="true"/>
-    <TPLaunchHelpLink xmlns="4873beb7-5857-4685-be1f-d57550cc96cc" xsi:nil="true"/>
-    <TPApplication xmlns="4873beb7-5857-4685-be1f-d57550cc96cc" xsi:nil="true"/>
-    <CrawlForDependencies xmlns="4873beb7-5857-4685-be1f-d57550cc96cc">false</CrawlForDependencies>
-    <HandoffToMSDN xmlns="4873beb7-5857-4685-be1f-d57550cc96cc" xsi:nil="true"/>
-    <PlannedPubDate xmlns="4873beb7-5857-4685-be1f-d57550cc96cc" xsi:nil="true"/>
-    <IntlLangReviewer xmlns="4873beb7-5857-4685-be1f-d57550cc96cc" xsi:nil="true"/>
-    <TrustLevel xmlns="4873beb7-5857-4685-be1f-d57550cc96cc">1 Microsoft Managed Content</TrustLevel>
-    <LocLastLocAttemptVersionLookup xmlns="4873beb7-5857-4685-be1f-d57550cc96cc">694266</LocLastLocAttemptVersionLookup>
-    <LocProcessedForHandoffsLookup xmlns="4873beb7-5857-4685-be1f-d57550cc96cc" xsi:nil="true"/>
-    <IsSearchable xmlns="4873beb7-5857-4685-be1f-d57550cc96cc">true</IsSearchable>
-    <TemplateTemplateType xmlns="4873beb7-5857-4685-be1f-d57550cc96cc">PowerPoint Presentation Template</TemplateTemplateType>
-    <CampaignTagsTaxHTField0 xmlns="4873beb7-5857-4685-be1f-d57550cc96cc">
-      <Terms xmlns="http://schemas.microsoft.com/office/infopath/2007/PartnerControls"/>
-    </CampaignTagsTaxHTField0>
-    <TPNamespace xmlns="4873beb7-5857-4685-be1f-d57550cc96cc" xsi:nil="true"/>
-    <LocOverallPreviewStatusLookup xmlns="4873beb7-5857-4685-be1f-d57550cc96cc" xsi:nil="true"/>
-    <TaxCatchAll xmlns="4873beb7-5857-4685-be1f-d57550cc96cc"/>
-    <Markets xmlns="4873beb7-5857-4685-be1f-d57550cc96cc"/>
-    <UAProjectedTotalWords xmlns="4873beb7-5857-4685-be1f-d57550cc96cc" xsi:nil="true"/>
-    <IntlLangReview xmlns="4873beb7-5857-4685-be1f-d57550cc96cc" xsi:nil="true"/>
-    <OutputCachingOn xmlns="4873beb7-5857-4685-be1f-d57550cc96cc">false</OutputCachingOn>
-    <AverageRating xmlns="4873beb7-5857-4685-be1f-d57550cc96cc" xsi:nil="true"/>
-    <APAuthor xmlns="4873beb7-5857-4685-be1f-d57550cc96cc">
-      <UserInfo>
-        <DisplayName>REDMOND\kristaa</DisplayName>
-        <AccountId>136</AccountId>
-        <AccountType/>
-      </UserInfo>
-    </APAuthor>
-    <LocManualTestRequired xmlns="4873beb7-5857-4685-be1f-d57550cc96cc">false</LocManualTestRequired>
-    <TPCommandLine xmlns="4873beb7-5857-4685-be1f-d57550cc96cc" xsi:nil="true"/>
-    <TPAppVersion xmlns="4873beb7-5857-4685-be1f-d57550cc96cc" xsi:nil="true"/>
-    <EditorialStatus xmlns="4873beb7-5857-4685-be1f-d57550cc96cc">Complete</EditorialStatus>
-    <LastModifiedDateTime xmlns="4873beb7-5857-4685-be1f-d57550cc96cc" xsi:nil="true"/>
-    <ScenarioTagsTaxHTField0 xmlns="4873beb7-5857-4685-be1f-d57550cc96cc">
-      <Terms xmlns="http://schemas.microsoft.com/office/infopath/2007/PartnerControls"/>
-    </ScenarioTagsTaxHTField0>
-    <LocProcessedForMarketsLookup xmlns="4873beb7-5857-4685-be1f-d57550cc96cc" xsi:nil="true"/>
-    <TPLaunchHelpLinkType xmlns="4873beb7-5857-4685-be1f-d57550cc96cc">Template</TPLaunchHelpLinkType>
-    <OriginalRelease xmlns="4873beb7-5857-4685-be1f-d57550cc96cc">15</OriginalRelease>
-    <LocalizationTagsTaxHTField0 xmlns="4873beb7-5857-4685-be1f-d57550cc96cc">
-      <Terms xmlns="http://schemas.microsoft.com/office/infopath/2007/PartnerControls"/>
-    </LocalizationTagsTaxHTField0>
-    <UACurrentWords xmlns="4873beb7-5857-4685-be1f-d57550cc96cc" xsi:nil="true"/>
-    <ArtSampleDocs xmlns="4873beb7-5857-4685-be1f-d57550cc96cc" xsi:nil="true"/>
-    <UALocRecommendation xmlns="4873beb7-5857-4685-be1f-d57550cc96cc">Localize</UALocRecommendation>
-    <Manager xmlns="4873beb7-5857-4685-be1f-d57550cc96cc" xsi:nil="true"/>
-    <LocOverallHandbackStatusLookup xmlns="4873beb7-5857-4685-be1f-d57550cc96cc" xsi:nil="true"/>
-    <ShowIn xmlns="4873beb7-5857-4685-be1f-d57550cc96cc">Show everywhere</ShowIn>
-    <UANotes xmlns="4873beb7-5857-4685-be1f-d57550cc96cc" xsi:nil="true"/>
-    <InternalTagsTaxHTField0 xmlns="4873beb7-5857-4685-be1f-d57550cc96cc">
-      <Terms xmlns="http://schemas.microsoft.com/office/infopath/2007/PartnerControls"/>
-    </InternalTagsTaxHTField0>
-    <CSXHash xmlns="4873beb7-5857-4685-be1f-d57550cc96cc" xsi:nil="true"/>
-    <VoteCount xmlns="4873beb7-5857-4685-be1f-d57550cc96cc" xsi:nil="true"/>
-    <AssetExpire xmlns="4873beb7-5857-4685-be1f-d57550cc96cc">2029-05-12T07:00:00+00:00</AssetExpire>
-    <DSATActionTaken xmlns="4873beb7-5857-4685-be1f-d57550cc96cc" xsi:nil="true"/>
-    <CSXSubmissionMarket xmlns="4873beb7-5857-4685-be1f-d57550cc96cc" xsi:nil="true"/>
-    <LocMarketGroupTiers2 xmlns="4873beb7-5857-4685-be1f-d57550cc96cc" xsi:nil="true"/>
-  </documentManagement>
-</p:properties>
+<?mso-contentType ?>
+<FormTemplates xmlns="http://schemas.microsoft.com/sharepoint/v3/contenttype/forms">
+  <Display>DocumentLibraryForm</Display>
+  <Edit>AssetEditForm</Edit>
+  <New>DocumentLibraryForm</New>
+</FormTemplates>
 </file>
 
 <file path=customXml/item2.xml><?xml version="1.0" encoding="utf-8"?>
@@ -8470,26 +8384,145 @@
 </file>
 
 <file path=customXml/item3.xml><?xml version="1.0" encoding="utf-8"?>
-<?mso-contentType ?>
-<FormTemplates xmlns="http://schemas.microsoft.com/sharepoint/v3/contenttype/forms">
-  <Display>DocumentLibraryForm</Display>
-  <Edit>AssetEditForm</Edit>
-  <New>DocumentLibraryForm</New>
-</FormTemplates>
+<p:properties xmlns:p="http://schemas.microsoft.com/office/2006/metadata/properties" xmlns:xsi="http://www.w3.org/2001/XMLSchema-instance" xmlns:pc="http://schemas.microsoft.com/office/infopath/2007/PartnerControls">
+  <documentManagement>
+    <LocPublishedLinkedAssetsLookup xmlns="4873beb7-5857-4685-be1f-d57550cc96cc" xsi:nil="true"/>
+    <ApprovalStatus xmlns="4873beb7-5857-4685-be1f-d57550cc96cc">InProgress</ApprovalStatus>
+    <MarketSpecific xmlns="4873beb7-5857-4685-be1f-d57550cc96cc">false</MarketSpecific>
+    <LocComments xmlns="4873beb7-5857-4685-be1f-d57550cc96cc" xsi:nil="true"/>
+    <LocLastLocAttemptVersionTypeLookup xmlns="4873beb7-5857-4685-be1f-d57550cc96cc" xsi:nil="true"/>
+    <DirectSourceMarket xmlns="4873beb7-5857-4685-be1f-d57550cc96cc" xsi:nil="true"/>
+    <ThumbnailAssetId xmlns="4873beb7-5857-4685-be1f-d57550cc96cc" xsi:nil="true"/>
+    <PrimaryImageGen xmlns="4873beb7-5857-4685-be1f-d57550cc96cc">false</PrimaryImageGen>
+    <LocNewPublishedVersionLookup xmlns="4873beb7-5857-4685-be1f-d57550cc96cc" xsi:nil="true"/>
+    <LegacyData xmlns="4873beb7-5857-4685-be1f-d57550cc96cc" xsi:nil="true"/>
+    <LocRecommendedHandoff xmlns="4873beb7-5857-4685-be1f-d57550cc96cc" xsi:nil="true"/>
+    <BusinessGroup xmlns="4873beb7-5857-4685-be1f-d57550cc96cc" xsi:nil="true"/>
+    <BlockPublish xmlns="4873beb7-5857-4685-be1f-d57550cc96cc">false</BlockPublish>
+    <TPFriendlyName xmlns="4873beb7-5857-4685-be1f-d57550cc96cc" xsi:nil="true"/>
+    <LocOverallPublishStatusLookup xmlns="4873beb7-5857-4685-be1f-d57550cc96cc" xsi:nil="true"/>
+    <NumericId xmlns="4873beb7-5857-4685-be1f-d57550cc96cc" xsi:nil="true"/>
+    <APEditor xmlns="4873beb7-5857-4685-be1f-d57550cc96cc">
+      <UserInfo>
+        <DisplayName/>
+        <AccountId xsi:nil="true"/>
+        <AccountType/>
+      </UserInfo>
+    </APEditor>
+    <SourceTitle xmlns="4873beb7-5857-4685-be1f-d57550cc96cc" xsi:nil="true"/>
+    <OpenTemplate xmlns="4873beb7-5857-4685-be1f-d57550cc96cc">true</OpenTemplate>
+    <LocOverallLocStatusLookup xmlns="4873beb7-5857-4685-be1f-d57550cc96cc" xsi:nil="true"/>
+    <UALocComments xmlns="4873beb7-5857-4685-be1f-d57550cc96cc" xsi:nil="true"/>
+    <ParentAssetId xmlns="4873beb7-5857-4685-be1f-d57550cc96cc" xsi:nil="true"/>
+    <IntlLangReviewDate xmlns="4873beb7-5857-4685-be1f-d57550cc96cc" xsi:nil="true"/>
+    <FeatureTagsTaxHTField0 xmlns="4873beb7-5857-4685-be1f-d57550cc96cc">
+      <Terms xmlns="http://schemas.microsoft.com/office/infopath/2007/PartnerControls"/>
+    </FeatureTagsTaxHTField0>
+    <PublishStatusLookup xmlns="4873beb7-5857-4685-be1f-d57550cc96cc">
+      <Value>1345093</Value>
+    </PublishStatusLookup>
+    <Providers xmlns="4873beb7-5857-4685-be1f-d57550cc96cc" xsi:nil="true"/>
+    <MachineTranslated xmlns="4873beb7-5857-4685-be1f-d57550cc96cc">false</MachineTranslated>
+    <OriginalSourceMarket xmlns="4873beb7-5857-4685-be1f-d57550cc96cc" xsi:nil="true"/>
+    <APDescription xmlns="4873beb7-5857-4685-be1f-d57550cc96cc">This simple template design works for technology and  businesses, but it's versatile enough to use in other contexts.  It features multiple slide layouts designed for widescreen (16x9 resolution) and includes a sample SmartArt list and chart that are easily editable.</APDescription>
+    <ClipArtFilename xmlns="4873beb7-5857-4685-be1f-d57550cc96cc" xsi:nil="true"/>
+    <ContentItem xmlns="4873beb7-5857-4685-be1f-d57550cc96cc" xsi:nil="true"/>
+    <TPInstallLocation xmlns="4873beb7-5857-4685-be1f-d57550cc96cc" xsi:nil="true"/>
+    <PublishTargets xmlns="4873beb7-5857-4685-be1f-d57550cc96cc">OfficeOnlineVNext</PublishTargets>
+    <TimesCloned xmlns="4873beb7-5857-4685-be1f-d57550cc96cc" xsi:nil="true"/>
+    <AssetStart xmlns="4873beb7-5857-4685-be1f-d57550cc96cc">2011-11-26T00:30:00+00:00</AssetStart>
+    <Provider xmlns="4873beb7-5857-4685-be1f-d57550cc96cc" xsi:nil="true"/>
+    <AcquiredFrom xmlns="4873beb7-5857-4685-be1f-d57550cc96cc">Internal MS</AcquiredFrom>
+    <FriendlyTitle xmlns="4873beb7-5857-4685-be1f-d57550cc96cc" xsi:nil="true"/>
+    <LastHandOff xmlns="4873beb7-5857-4685-be1f-d57550cc96cc" xsi:nil="true"/>
+    <TPClientViewer xmlns="4873beb7-5857-4685-be1f-d57550cc96cc" xsi:nil="true"/>
+    <TemplateStatus xmlns="4873beb7-5857-4685-be1f-d57550cc96cc">Complete</TemplateStatus>
+    <Downloads xmlns="4873beb7-5857-4685-be1f-d57550cc96cc">0</Downloads>
+    <OOCacheId xmlns="4873beb7-5857-4685-be1f-d57550cc96cc" xsi:nil="true"/>
+    <IsDeleted xmlns="4873beb7-5857-4685-be1f-d57550cc96cc">false</IsDeleted>
+    <LocPublishedDependentAssetsLookup xmlns="4873beb7-5857-4685-be1f-d57550cc96cc" xsi:nil="true"/>
+    <TPExecutable xmlns="4873beb7-5857-4685-be1f-d57550cc96cc" xsi:nil="true"/>
+    <EditorialTags xmlns="4873beb7-5857-4685-be1f-d57550cc96cc" xsi:nil="true"/>
+    <SubmitterId xmlns="4873beb7-5857-4685-be1f-d57550cc96cc" xsi:nil="true"/>
+    <ApprovalLog xmlns="4873beb7-5857-4685-be1f-d57550cc96cc" xsi:nil="true"/>
+    <AssetType xmlns="4873beb7-5857-4685-be1f-d57550cc96cc">TP</AssetType>
+    <BugNumber xmlns="4873beb7-5857-4685-be1f-d57550cc96cc" xsi:nil="true"/>
+    <CSXSubmissionDate xmlns="4873beb7-5857-4685-be1f-d57550cc96cc" xsi:nil="true"/>
+    <CSXUpdate xmlns="4873beb7-5857-4685-be1f-d57550cc96cc">false</CSXUpdate>
+    <Milestone xmlns="4873beb7-5857-4685-be1f-d57550cc96cc" xsi:nil="true"/>
+    <RecommendationsModifier xmlns="4873beb7-5857-4685-be1f-d57550cc96cc" xsi:nil="true"/>
+    <OriginAsset xmlns="4873beb7-5857-4685-be1f-d57550cc96cc" xsi:nil="true"/>
+    <TPComponent xmlns="4873beb7-5857-4685-be1f-d57550cc96cc" xsi:nil="true"/>
+    <AssetId xmlns="4873beb7-5857-4685-be1f-d57550cc96cc">TP102787989</AssetId>
+    <IntlLocPriority xmlns="4873beb7-5857-4685-be1f-d57550cc96cc" xsi:nil="true"/>
+    <PolicheckWords xmlns="4873beb7-5857-4685-be1f-d57550cc96cc" xsi:nil="true"/>
+    <TPLaunchHelpLink xmlns="4873beb7-5857-4685-be1f-d57550cc96cc" xsi:nil="true"/>
+    <TPApplication xmlns="4873beb7-5857-4685-be1f-d57550cc96cc" xsi:nil="true"/>
+    <CrawlForDependencies xmlns="4873beb7-5857-4685-be1f-d57550cc96cc">false</CrawlForDependencies>
+    <HandoffToMSDN xmlns="4873beb7-5857-4685-be1f-d57550cc96cc" xsi:nil="true"/>
+    <PlannedPubDate xmlns="4873beb7-5857-4685-be1f-d57550cc96cc" xsi:nil="true"/>
+    <IntlLangReviewer xmlns="4873beb7-5857-4685-be1f-d57550cc96cc" xsi:nil="true"/>
+    <TrustLevel xmlns="4873beb7-5857-4685-be1f-d57550cc96cc">1 Microsoft Managed Content</TrustLevel>
+    <LocLastLocAttemptVersionLookup xmlns="4873beb7-5857-4685-be1f-d57550cc96cc">694266</LocLastLocAttemptVersionLookup>
+    <LocProcessedForHandoffsLookup xmlns="4873beb7-5857-4685-be1f-d57550cc96cc" xsi:nil="true"/>
+    <IsSearchable xmlns="4873beb7-5857-4685-be1f-d57550cc96cc">true</IsSearchable>
+    <TemplateTemplateType xmlns="4873beb7-5857-4685-be1f-d57550cc96cc">PowerPoint Presentation Template</TemplateTemplateType>
+    <CampaignTagsTaxHTField0 xmlns="4873beb7-5857-4685-be1f-d57550cc96cc">
+      <Terms xmlns="http://schemas.microsoft.com/office/infopath/2007/PartnerControls"/>
+    </CampaignTagsTaxHTField0>
+    <TPNamespace xmlns="4873beb7-5857-4685-be1f-d57550cc96cc" xsi:nil="true"/>
+    <LocOverallPreviewStatusLookup xmlns="4873beb7-5857-4685-be1f-d57550cc96cc" xsi:nil="true"/>
+    <TaxCatchAll xmlns="4873beb7-5857-4685-be1f-d57550cc96cc"/>
+    <Markets xmlns="4873beb7-5857-4685-be1f-d57550cc96cc"/>
+    <UAProjectedTotalWords xmlns="4873beb7-5857-4685-be1f-d57550cc96cc" xsi:nil="true"/>
+    <IntlLangReview xmlns="4873beb7-5857-4685-be1f-d57550cc96cc" xsi:nil="true"/>
+    <OutputCachingOn xmlns="4873beb7-5857-4685-be1f-d57550cc96cc">false</OutputCachingOn>
+    <AverageRating xmlns="4873beb7-5857-4685-be1f-d57550cc96cc" xsi:nil="true"/>
+    <APAuthor xmlns="4873beb7-5857-4685-be1f-d57550cc96cc">
+      <UserInfo>
+        <DisplayName>REDMOND\kristaa</DisplayName>
+        <AccountId>136</AccountId>
+        <AccountType/>
+      </UserInfo>
+    </APAuthor>
+    <LocManualTestRequired xmlns="4873beb7-5857-4685-be1f-d57550cc96cc">false</LocManualTestRequired>
+    <TPCommandLine xmlns="4873beb7-5857-4685-be1f-d57550cc96cc" xsi:nil="true"/>
+    <TPAppVersion xmlns="4873beb7-5857-4685-be1f-d57550cc96cc" xsi:nil="true"/>
+    <EditorialStatus xmlns="4873beb7-5857-4685-be1f-d57550cc96cc">Complete</EditorialStatus>
+    <LastModifiedDateTime xmlns="4873beb7-5857-4685-be1f-d57550cc96cc" xsi:nil="true"/>
+    <ScenarioTagsTaxHTField0 xmlns="4873beb7-5857-4685-be1f-d57550cc96cc">
+      <Terms xmlns="http://schemas.microsoft.com/office/infopath/2007/PartnerControls"/>
+    </ScenarioTagsTaxHTField0>
+    <LocProcessedForMarketsLookup xmlns="4873beb7-5857-4685-be1f-d57550cc96cc" xsi:nil="true"/>
+    <TPLaunchHelpLinkType xmlns="4873beb7-5857-4685-be1f-d57550cc96cc">Template</TPLaunchHelpLinkType>
+    <OriginalRelease xmlns="4873beb7-5857-4685-be1f-d57550cc96cc">15</OriginalRelease>
+    <LocalizationTagsTaxHTField0 xmlns="4873beb7-5857-4685-be1f-d57550cc96cc">
+      <Terms xmlns="http://schemas.microsoft.com/office/infopath/2007/PartnerControls"/>
+    </LocalizationTagsTaxHTField0>
+    <UACurrentWords xmlns="4873beb7-5857-4685-be1f-d57550cc96cc" xsi:nil="true"/>
+    <ArtSampleDocs xmlns="4873beb7-5857-4685-be1f-d57550cc96cc" xsi:nil="true"/>
+    <UALocRecommendation xmlns="4873beb7-5857-4685-be1f-d57550cc96cc">Localize</UALocRecommendation>
+    <Manager xmlns="4873beb7-5857-4685-be1f-d57550cc96cc" xsi:nil="true"/>
+    <LocOverallHandbackStatusLookup xmlns="4873beb7-5857-4685-be1f-d57550cc96cc" xsi:nil="true"/>
+    <ShowIn xmlns="4873beb7-5857-4685-be1f-d57550cc96cc">Show everywhere</ShowIn>
+    <UANotes xmlns="4873beb7-5857-4685-be1f-d57550cc96cc" xsi:nil="true"/>
+    <InternalTagsTaxHTField0 xmlns="4873beb7-5857-4685-be1f-d57550cc96cc">
+      <Terms xmlns="http://schemas.microsoft.com/office/infopath/2007/PartnerControls"/>
+    </InternalTagsTaxHTField0>
+    <CSXHash xmlns="4873beb7-5857-4685-be1f-d57550cc96cc" xsi:nil="true"/>
+    <VoteCount xmlns="4873beb7-5857-4685-be1f-d57550cc96cc" xsi:nil="true"/>
+    <AssetExpire xmlns="4873beb7-5857-4685-be1f-d57550cc96cc">2029-05-12T07:00:00+00:00</AssetExpire>
+    <DSATActionTaken xmlns="4873beb7-5857-4685-be1f-d57550cc96cc" xsi:nil="true"/>
+    <CSXSubmissionMarket xmlns="4873beb7-5857-4685-be1f-d57550cc96cc" xsi:nil="true"/>
+    <LocMarketGroupTiers2 xmlns="4873beb7-5857-4685-be1f-d57550cc96cc" xsi:nil="true"/>
+  </documentManagement>
+</p:properties>
 </file>
 
 <file path=customXml/itemProps1.xml><?xml version="1.0" encoding="utf-8"?>
-<ds:datastoreItem xmlns:ds="http://schemas.openxmlformats.org/officeDocument/2006/customXml" ds:itemID="{60C67BEE-D13F-4BD2-98A5-34D8A0977F68}">
+<ds:datastoreItem xmlns:ds="http://schemas.openxmlformats.org/officeDocument/2006/customXml" ds:itemID="{3836F65B-1B07-41EE-A0E8-BC6EF3855225}">
   <ds:schemaRefs>
-    <ds:schemaRef ds:uri="4873beb7-5857-4685-be1f-d57550cc96cc"/>
-    <ds:schemaRef ds:uri="http://schemas.openxmlformats.org/package/2006/metadata/core-properties"/>
-    <ds:schemaRef ds:uri="http://purl.org/dc/terms/"/>
-    <ds:schemaRef ds:uri="http://schemas.microsoft.com/office/2006/documentManagement/types"/>
-    <ds:schemaRef ds:uri="http://purl.org/dc/elements/1.1/"/>
-    <ds:schemaRef ds:uri="http://schemas.microsoft.com/office/2006/metadata/properties"/>
-    <ds:schemaRef ds:uri="http://schemas.microsoft.com/office/infopath/2007/PartnerControls"/>
-    <ds:schemaRef ds:uri="http://www.w3.org/XML/1998/namespace"/>
-    <ds:schemaRef ds:uri="http://purl.org/dc/dcmitype/"/>
+    <ds:schemaRef ds:uri="http://schemas.microsoft.com/sharepoint/v3/contenttype/forms"/>
   </ds:schemaRefs>
 </ds:datastoreItem>
 </file>
@@ -8513,9 +8546,17 @@
 </file>
 
 <file path=customXml/itemProps3.xml><?xml version="1.0" encoding="utf-8"?>
-<ds:datastoreItem xmlns:ds="http://schemas.openxmlformats.org/officeDocument/2006/customXml" ds:itemID="{3836F65B-1B07-41EE-A0E8-BC6EF3855225}">
+<ds:datastoreItem xmlns:ds="http://schemas.openxmlformats.org/officeDocument/2006/customXml" ds:itemID="{60C67BEE-D13F-4BD2-98A5-34D8A0977F68}">
   <ds:schemaRefs>
-    <ds:schemaRef ds:uri="http://schemas.microsoft.com/sharepoint/v3/contenttype/forms"/>
+    <ds:schemaRef ds:uri="4873beb7-5857-4685-be1f-d57550cc96cc"/>
+    <ds:schemaRef ds:uri="http://schemas.openxmlformats.org/package/2006/metadata/core-properties"/>
+    <ds:schemaRef ds:uri="http://purl.org/dc/terms/"/>
+    <ds:schemaRef ds:uri="http://schemas.microsoft.com/office/2006/documentManagement/types"/>
+    <ds:schemaRef ds:uri="http://purl.org/dc/elements/1.1/"/>
+    <ds:schemaRef ds:uri="http://schemas.microsoft.com/office/2006/metadata/properties"/>
+    <ds:schemaRef ds:uri="http://schemas.microsoft.com/office/infopath/2007/PartnerControls"/>
+    <ds:schemaRef ds:uri="http://www.w3.org/XML/1998/namespace"/>
+    <ds:schemaRef ds:uri="http://purl.org/dc/dcmitype/"/>
   </ds:schemaRefs>
 </ds:datastoreItem>
 </file>
</xml_diff>